<commit_message>
Merged some of Hattan's changes to presentation
git-svn-id: http://fbms.googlecode.com/svn/trunk@579 c375ce47-9a4c-63b9-7dad-5ffa0e8ccef7
</commit_message>
<xml_diff>
--- a/doc/milestone_6/final_presentation.pptx
+++ b/doc/milestone_6/final_presentation.pptx
@@ -534,7 +534,7 @@
       </p:grpSpPr>
       <p:sp>
         <p:nvSpPr>
-          <p:cNvPr id="170" name="PlaceHolder 1"/>
+          <p:cNvPr id="168" name="PlaceHolder 1"/>
           <p:cNvSpPr>
             <a:spLocks noGrp="1"/>
           </p:cNvSpPr>
@@ -564,15 +564,7 @@
             </a:pPr>
             <a:r>
               <a:rPr lang="en-US"/>
-              <a:t>Mention how the interfaces use local L&amp;F, sizing constraints; mention we support WINDOWS and LINUX (</a:t>
-            </a:r>
-            <a:r>
-              <a:rPr lang="en-US" b="1"/>
-              <a:t>no</a:t>
-            </a:r>
-            <a:r>
-              <a:rPr lang="en-US"/>
-              <a:t> support for macs)</a:t>
+              <a:t>Mention how startup scan compares file contents to detect differences between the files; still revisions changes</a:t>
             </a:r>
             <a:endParaRPr/>
           </a:p>
@@ -586,43 +578,15 @@
             </a:pPr>
             <a:r>
               <a:rPr lang="en-US"/>
-              <a:t>First library failed, used a different one instead</a:t>
-            </a:r>
-            <a:endParaRPr/>
-          </a:p>
-          <a:p>
-            <a:pPr>
-              <a:lnSpc>
-                <a:spcPct val="100000"/>
-              </a:lnSpc>
-              <a:buFont typeface="Arial"/>
-              <a:buChar char="•"/>
-            </a:pPr>
-            <a:r>
-              <a:rPr lang="en-US"/>
-              <a:t>User friendly GUI needs mention of changes to default table behavior, keyboard navigation, etc. Mimicking a file browser</a:t>
-            </a:r>
-            <a:endParaRPr/>
-          </a:p>
-          <a:p>
-            <a:pPr>
-              <a:lnSpc>
-                <a:spcPct val="100000"/>
-              </a:lnSpc>
-              <a:buFont typeface="Arial"/>
-              <a:buChar char="•"/>
-            </a:pPr>
-            <a:r>
-              <a:rPr lang="en-US"/>
-              <a:t>Mention how binary files are stored differently in the revision database and required changes around the board</a:t>
-            </a:r>
-            <a:endParaRPr/>
-          </a:p>
-        </p:txBody>
-      </p:sp>
-      <p:sp>
-        <p:nvSpPr>
-          <p:cNvPr id="171" name="CustomShape 2"/>
+              <a:t>Trim feature disabled by default; removes files older than a user specified number of days</a:t>
+            </a:r>
+            <a:endParaRPr/>
+          </a:p>
+        </p:txBody>
+      </p:sp>
+      <p:sp>
+        <p:nvSpPr>
+          <p:cNvPr id="169" name="CustomShape 2"/>
           <p:cNvSpPr/>
           <p:nvPr/>
         </p:nvSpPr>
@@ -648,7 +612,7 @@
                 <a:spcPct val="100000"/>
               </a:lnSpc>
             </a:pPr>
-            <a:fld id="{280BDD30-5755-4864-AB0F-322B5A220870}" type="slidenum">
+            <a:fld id="{096FD3AC-B4A2-4AE5-93A8-1C5DF2FDA5C7}" type="slidenum">
               <a:rPr lang="en-US" sz="1200">
                 <a:solidFill>
                   <a:srgbClr val="000000"/>
@@ -656,7 +620,7 @@
                 <a:latin typeface="+mn-lt"/>
                 <a:ea typeface="+mn-ea"/>
               </a:rPr>
-              <a:t>13</a:t>
+              <a:t>12</a:t>
             </a:fld>
             <a:endParaRPr/>
           </a:p>
@@ -689,7 +653,7 @@
       </p:grpSpPr>
       <p:sp>
         <p:nvSpPr>
-          <p:cNvPr id="172" name="PlaceHolder 1"/>
+          <p:cNvPr id="170" name="PlaceHolder 1"/>
           <p:cNvSpPr>
             <a:spLocks noGrp="1"/>
           </p:cNvSpPr>
@@ -719,7 +683,15 @@
             </a:pPr>
             <a:r>
               <a:rPr lang="en-US"/>
-              <a:t>Mention how swap files are recognized in the system as a create and a rename, which requires special handling</a:t>
+              <a:t>Mention how the interfaces use local L&amp;F, sizing constraints; mention we support WINDOWS and LINUX (</a:t>
+            </a:r>
+            <a:r>
+              <a:rPr lang="en-US" b="1"/>
+              <a:t>no</a:t>
+            </a:r>
+            <a:r>
+              <a:rPr lang="en-US"/>
+              <a:t> support for macs)</a:t>
             </a:r>
             <a:endParaRPr/>
           </a:p>
@@ -733,7 +705,7 @@
             </a:pPr>
             <a:r>
               <a:rPr lang="en-US"/>
-              <a:t>Other editors will be recognized as merely an edit</a:t>
+              <a:t>First library failed, used a different one instead</a:t>
             </a:r>
             <a:endParaRPr/>
           </a:p>
@@ -747,7 +719,7 @@
             </a:pPr>
             <a:r>
               <a:rPr lang="en-US"/>
-              <a:t>Files could be created in a way that overwrites an existing file</a:t>
+              <a:t>User friendly GUI needs mention of changes to default table behavior, keyboard navigation, etc. Mimicking a file browser</a:t>
             </a:r>
             <a:endParaRPr/>
           </a:p>
@@ -761,15 +733,15 @@
             </a:pPr>
             <a:r>
               <a:rPr lang="en-US"/>
-              <a:t>All of these cases are considered to be “modifying” a file, despite how their internal representation is</a:t>
-            </a:r>
-            <a:endParaRPr/>
-          </a:p>
-        </p:txBody>
-      </p:sp>
-      <p:sp>
-        <p:nvSpPr>
-          <p:cNvPr id="173" name="CustomShape 2"/>
+              <a:t>Mention how binary files are stored differently in the revision database and required changes around the board</a:t>
+            </a:r>
+            <a:endParaRPr/>
+          </a:p>
+        </p:txBody>
+      </p:sp>
+      <p:sp>
+        <p:nvSpPr>
+          <p:cNvPr id="171" name="CustomShape 2"/>
           <p:cNvSpPr/>
           <p:nvPr/>
         </p:nvSpPr>
@@ -795,7 +767,7 @@
                 <a:spcPct val="100000"/>
               </a:lnSpc>
             </a:pPr>
-            <a:fld id="{9BC689D5-1197-4AF0-8447-59C216BC0892}" type="slidenum">
+            <a:fld id="{280BDD30-5755-4864-AB0F-322B5A220870}" type="slidenum">
               <a:rPr lang="en-US" sz="1200">
                 <a:solidFill>
                   <a:srgbClr val="000000"/>
@@ -803,7 +775,7 @@
                 <a:latin typeface="+mn-lt"/>
                 <a:ea typeface="+mn-ea"/>
               </a:rPr>
-              <a:t>14</a:t>
+              <a:t>13</a:t>
             </a:fld>
             <a:endParaRPr/>
           </a:p>
@@ -836,7 +808,7 @@
       </p:grpSpPr>
       <p:sp>
         <p:nvSpPr>
-          <p:cNvPr id="174" name="PlaceHolder 1"/>
+          <p:cNvPr id="172" name="PlaceHolder 1"/>
           <p:cNvSpPr>
             <a:spLocks noGrp="1"/>
           </p:cNvSpPr>
@@ -916,7 +888,7 @@
       </p:sp>
       <p:sp>
         <p:nvSpPr>
-          <p:cNvPr id="175" name="CustomShape 2"/>
+          <p:cNvPr id="173" name="CustomShape 2"/>
           <p:cNvSpPr/>
           <p:nvPr/>
         </p:nvSpPr>
@@ -942,7 +914,7 @@
                 <a:spcPct val="100000"/>
               </a:lnSpc>
             </a:pPr>
-            <a:fld id="{EAB19A50-E81F-46B5-A051-0A8329BA354C}" type="slidenum">
+            <a:fld id="{9BC689D5-1197-4AF0-8447-59C216BC0892}" type="slidenum">
               <a:rPr lang="en-US" sz="1200">
                 <a:solidFill>
                   <a:srgbClr val="000000"/>
@@ -950,7 +922,7 @@
                 <a:latin typeface="+mn-lt"/>
                 <a:ea typeface="+mn-ea"/>
               </a:rPr>
-              <a:t>15</a:t>
+              <a:t>14</a:t>
             </a:fld>
             <a:endParaRPr/>
           </a:p>
@@ -983,7 +955,7 @@
       </p:grpSpPr>
       <p:sp>
         <p:nvSpPr>
-          <p:cNvPr id="176" name="PlaceHolder 1"/>
+          <p:cNvPr id="174" name="PlaceHolder 1"/>
           <p:cNvSpPr>
             <a:spLocks noGrp="1"/>
           </p:cNvSpPr>
@@ -1013,19 +985,7 @@
             </a:pPr>
             <a:r>
               <a:rPr lang="en-US"/>
-              <a:t>Mention that the patch is BACKWARDS!!! </a:t>
-            </a:r>
-            <a:r>
-              <a:rPr lang="en-US">
-                <a:latin typeface="Wingdings"/>
-              </a:rPr>
-              <a:t> </a:t>
-            </a:r>
-            <a:r>
-              <a:rPr lang="en-US" b="1">
-                <a:latin typeface="Wingdings"/>
-              </a:rPr>
-              <a:t>Yo, this one’s important</a:t>
+              <a:t>Mention how swap files are recognized in the system as a create and a rename, which requires special handling</a:t>
             </a:r>
             <a:endParaRPr/>
           </a:p>
@@ -1038,10 +998,8 @@
               <a:buChar char="•"/>
             </a:pPr>
             <a:r>
-              <a:rPr lang="en-US">
-                <a:latin typeface="Wingdings"/>
-              </a:rPr>
-              <a:t>Patch goes from after to before</a:t>
+              <a:rPr lang="en-US"/>
+              <a:t>Other editors will be recognized as merely an edit</a:t>
             </a:r>
             <a:endParaRPr/>
           </a:p>
@@ -1054,18 +1012,30 @@
               <a:buChar char="•"/>
             </a:pPr>
             <a:r>
-              <a:rPr lang="en-US">
-                <a:latin typeface="Wingdings"/>
-              </a:rPr>
-              <a:t>This is because we only use the patches to restore older versions of the file</a:t>
-            </a:r>
-            <a:endParaRPr/>
-          </a:p>
-        </p:txBody>
-      </p:sp>
-      <p:sp>
-        <p:nvSpPr>
-          <p:cNvPr id="177" name="CustomShape 2"/>
+              <a:rPr lang="en-US"/>
+              <a:t>Files could be created in a way that overwrites an existing file</a:t>
+            </a:r>
+            <a:endParaRPr/>
+          </a:p>
+          <a:p>
+            <a:pPr>
+              <a:lnSpc>
+                <a:spcPct val="100000"/>
+              </a:lnSpc>
+              <a:buFont typeface="Arial"/>
+              <a:buChar char="•"/>
+            </a:pPr>
+            <a:r>
+              <a:rPr lang="en-US"/>
+              <a:t>All of these cases are considered to be “modifying” a file, despite how their internal representation is</a:t>
+            </a:r>
+            <a:endParaRPr/>
+          </a:p>
+        </p:txBody>
+      </p:sp>
+      <p:sp>
+        <p:nvSpPr>
+          <p:cNvPr id="175" name="CustomShape 2"/>
           <p:cNvSpPr/>
           <p:nvPr/>
         </p:nvSpPr>
@@ -1091,7 +1061,7 @@
                 <a:spcPct val="100000"/>
               </a:lnSpc>
             </a:pPr>
-            <a:fld id="{5FA99F1A-A90B-4EF9-A542-0A151AD5F2F1}" type="slidenum">
+            <a:fld id="{EAB19A50-E81F-46B5-A051-0A8329BA354C}" type="slidenum">
               <a:rPr lang="en-US" sz="1200">
                 <a:solidFill>
                   <a:srgbClr val="000000"/>
@@ -1099,7 +1069,7 @@
                 <a:latin typeface="+mn-lt"/>
                 <a:ea typeface="+mn-ea"/>
               </a:rPr>
-              <a:t>16</a:t>
+              <a:t>15</a:t>
             </a:fld>
             <a:endParaRPr/>
           </a:p>
@@ -1132,6 +1102,155 @@
       </p:grpSpPr>
       <p:sp>
         <p:nvSpPr>
+          <p:cNvPr id="176" name="PlaceHolder 1"/>
+          <p:cNvSpPr>
+            <a:spLocks noGrp="1"/>
+          </p:cNvSpPr>
+          <p:nvPr>
+            <p:ph type="body"/>
+          </p:nvPr>
+        </p:nvSpPr>
+        <p:spPr>
+          <a:xfrm>
+            <a:off x="685800" y="4343400"/>
+            <a:ext cx="5485680" cy="4114080"/>
+          </a:xfrm>
+          <a:prstGeom prst="rect">
+            <a:avLst/>
+          </a:prstGeom>
+        </p:spPr>
+        <p:txBody>
+          <a:bodyPr lIns="0" tIns="0" rIns="0" bIns="0"/>
+          <a:lstStyle/>
+          <a:p>
+            <a:pPr>
+              <a:lnSpc>
+                <a:spcPct val="100000"/>
+              </a:lnSpc>
+              <a:buFont typeface="Arial"/>
+              <a:buChar char="•"/>
+            </a:pPr>
+            <a:r>
+              <a:rPr lang="en-US"/>
+              <a:t>Mention that the patch is BACKWARDS!!! </a:t>
+            </a:r>
+            <a:r>
+              <a:rPr lang="en-US">
+                <a:latin typeface="Wingdings"/>
+              </a:rPr>
+              <a:t> </a:t>
+            </a:r>
+            <a:r>
+              <a:rPr lang="en-US" b="1">
+                <a:latin typeface="Wingdings"/>
+              </a:rPr>
+              <a:t>Yo, this one’s important</a:t>
+            </a:r>
+            <a:endParaRPr/>
+          </a:p>
+          <a:p>
+            <a:pPr>
+              <a:lnSpc>
+                <a:spcPct val="100000"/>
+              </a:lnSpc>
+              <a:buFont typeface="Arial"/>
+              <a:buChar char="•"/>
+            </a:pPr>
+            <a:r>
+              <a:rPr lang="en-US">
+                <a:latin typeface="Wingdings"/>
+              </a:rPr>
+              <a:t>Patch goes from after to before</a:t>
+            </a:r>
+            <a:endParaRPr/>
+          </a:p>
+          <a:p>
+            <a:pPr>
+              <a:lnSpc>
+                <a:spcPct val="100000"/>
+              </a:lnSpc>
+              <a:buFont typeface="Arial"/>
+              <a:buChar char="•"/>
+            </a:pPr>
+            <a:r>
+              <a:rPr lang="en-US">
+                <a:latin typeface="Wingdings"/>
+              </a:rPr>
+              <a:t>This is because we only use the patches to restore older versions of the file</a:t>
+            </a:r>
+            <a:endParaRPr/>
+          </a:p>
+        </p:txBody>
+      </p:sp>
+      <p:sp>
+        <p:nvSpPr>
+          <p:cNvPr id="177" name="CustomShape 2"/>
+          <p:cNvSpPr/>
+          <p:nvPr/>
+        </p:nvSpPr>
+        <p:spPr>
+          <a:xfrm>
+            <a:off x="3884760" y="8685360"/>
+            <a:ext cx="2971080" cy="456480"/>
+          </a:xfrm>
+          <a:prstGeom prst="rect">
+            <a:avLst/>
+          </a:prstGeom>
+          <a:noFill/>
+          <a:ln>
+            <a:noFill/>
+          </a:ln>
+        </p:spPr>
+        <p:txBody>
+          <a:bodyPr lIns="90000" tIns="45000" rIns="90000" bIns="45000" anchor="b"/>
+          <a:lstStyle/>
+          <a:p>
+            <a:pPr algn="r">
+              <a:lnSpc>
+                <a:spcPct val="100000"/>
+              </a:lnSpc>
+            </a:pPr>
+            <a:fld id="{5FA99F1A-A90B-4EF9-A542-0A151AD5F2F1}" type="slidenum">
+              <a:rPr lang="en-US" sz="1200">
+                <a:solidFill>
+                  <a:srgbClr val="000000"/>
+                </a:solidFill>
+                <a:latin typeface="+mn-lt"/>
+                <a:ea typeface="+mn-ea"/>
+              </a:rPr>
+              <a:t>16</a:t>
+            </a:fld>
+            <a:endParaRPr/>
+          </a:p>
+        </p:txBody>
+      </p:sp>
+    </p:spTree>
+  </p:cSld>
+  <p:clrMapOvr>
+    <a:masterClrMapping/>
+  </p:clrMapOvr>
+</p:notes>
+</file>
+
+<file path=ppt/notesSlides/notesSlide15.xml><?xml version="1.0" encoding="utf-8"?>
+<p:notes xmlns:a="http://schemas.openxmlformats.org/drawingml/2006/main" xmlns:r="http://schemas.openxmlformats.org/officeDocument/2006/relationships" xmlns:p="http://schemas.openxmlformats.org/presentationml/2006/main">
+  <p:cSld>
+    <p:spTree>
+      <p:nvGrpSpPr>
+        <p:cNvPr id="1" name=""/>
+        <p:cNvGrpSpPr/>
+        <p:nvPr/>
+      </p:nvGrpSpPr>
+      <p:grpSpPr>
+        <a:xfrm>
+          <a:off x="0" y="0"/>
+          <a:ext cx="0" cy="0"/>
+          <a:chOff x="0" y="0"/>
+          <a:chExt cx="0" cy="0"/>
+        </a:xfrm>
+      </p:grpSpPr>
+      <p:sp>
+        <p:nvSpPr>
           <p:cNvPr id="178" name="PlaceHolder 1"/>
           <p:cNvSpPr>
             <a:spLocks noGrp="1"/>
@@ -1923,85 +2042,91 @@
       </p:grpSpPr>
       <p:sp>
         <p:nvSpPr>
-          <p:cNvPr id="166" name="PlaceHolder 1"/>
-          <p:cNvSpPr>
-            <a:spLocks noGrp="1"/>
-          </p:cNvSpPr>
-          <p:nvPr>
-            <p:ph type="body"/>
-          </p:nvPr>
-        </p:nvSpPr>
-        <p:spPr>
-          <a:xfrm>
-            <a:off x="685800" y="4343400"/>
-            <a:ext cx="5485680" cy="4114080"/>
-          </a:xfrm>
-          <a:prstGeom prst="rect">
-            <a:avLst/>
-          </a:prstGeom>
-        </p:spPr>
-        <p:txBody>
-          <a:bodyPr lIns="0" tIns="0" rIns="0" bIns="0"/>
-          <a:lstStyle/>
-          <a:p>
-            <a:pPr>
-              <a:lnSpc>
-                <a:spcPct val="100000"/>
-              </a:lnSpc>
-              <a:buFont typeface="Arial"/>
+          <p:cNvPr id="2" name="Slide Image Placeholder 1"/>
+          <p:cNvSpPr>
+            <a:spLocks noGrp="1" noRot="1" noChangeAspect="1"/>
+          </p:cNvSpPr>
+          <p:nvPr>
+            <p:ph type="sldImg"/>
+          </p:nvPr>
+        </p:nvSpPr>
+        <p:spPr>
+          <a:xfrm>
+            <a:off x="1143000" y="685800"/>
+            <a:ext cx="4572000" cy="3429000"/>
+          </a:xfrm>
+          <a:prstGeom prst="rect">
+            <a:avLst/>
+          </a:prstGeom>
+          <a:noFill/>
+          <a:ln w="12700">
+            <a:solidFill>
+              <a:prstClr val="black"/>
+            </a:solidFill>
+          </a:ln>
+        </p:spPr>
+      </p:sp>
+      <p:sp>
+        <p:nvSpPr>
+          <p:cNvPr id="3" name="Notes Placeholder 2"/>
+          <p:cNvSpPr>
+            <a:spLocks noGrp="1"/>
+          </p:cNvSpPr>
+          <p:nvPr>
+            <p:ph type="body" idx="1"/>
+          </p:nvPr>
+        </p:nvSpPr>
+        <p:spPr/>
+        <p:txBody>
+          <a:bodyPr/>
+          <a:lstStyle/>
+          <a:p>
+            <a:pPr marL="171450" indent="-171450">
+              <a:buFont typeface="Arial" panose="020B0604020202020204" pitchFamily="34" charset="0"/>
               <a:buChar char="•"/>
             </a:pPr>
             <a:r>
-              <a:rPr lang="en-US"/>
-              <a:t>Point out parts of this dialog</a:t>
-            </a:r>
-            <a:endParaRPr/>
-          </a:p>
-        </p:txBody>
-      </p:sp>
-      <p:sp>
-        <p:nvSpPr>
-          <p:cNvPr id="167" name="CustomShape 2"/>
-          <p:cNvSpPr/>
-          <p:nvPr/>
-        </p:nvSpPr>
-        <p:spPr>
-          <a:xfrm>
-            <a:off x="3884760" y="8685360"/>
-            <a:ext cx="2971080" cy="456480"/>
-          </a:xfrm>
-          <a:prstGeom prst="rect">
-            <a:avLst/>
-          </a:prstGeom>
-          <a:noFill/>
-          <a:ln>
-            <a:noFill/>
-          </a:ln>
-        </p:spPr>
-        <p:txBody>
-          <a:bodyPr lIns="90000" tIns="45000" rIns="90000" bIns="45000" anchor="b"/>
-          <a:lstStyle/>
-          <a:p>
-            <a:pPr algn="r">
-              <a:lnSpc>
-                <a:spcPct val="100000"/>
-              </a:lnSpc>
-            </a:pPr>
-            <a:fld id="{4E18DAAC-2076-4359-8E01-25007055AA73}" type="slidenum">
-              <a:rPr lang="en-US" sz="1200">
-                <a:solidFill>
-                  <a:srgbClr val="000000"/>
-                </a:solidFill>
-                <a:latin typeface="+mn-lt"/>
-                <a:ea typeface="+mn-ea"/>
-              </a:rPr>
-              <a:t>11</a:t>
+              <a:rPr lang="en-CA" dirty="0" smtClean="0"/>
+              <a:t>Mention</a:t>
+            </a:r>
+            <a:r>
+              <a:rPr lang="en-CA" baseline="0" dirty="0" smtClean="0"/>
+              <a:t> the various aspects of the dialog</a:t>
+            </a:r>
+            <a:endParaRPr lang="en-CA" dirty="0"/>
+          </a:p>
+        </p:txBody>
+      </p:sp>
+      <p:sp>
+        <p:nvSpPr>
+          <p:cNvPr id="4" name="Slide Number Placeholder 3"/>
+          <p:cNvSpPr>
+            <a:spLocks noGrp="1"/>
+          </p:cNvSpPr>
+          <p:nvPr>
+            <p:ph type="sldNum" idx="10"/>
+          </p:nvPr>
+        </p:nvSpPr>
+        <p:spPr/>
+        <p:txBody>
+          <a:bodyPr/>
+          <a:lstStyle/>
+          <a:p>
+            <a:pPr algn="r"/>
+            <a:fld id="{81483588-E839-4C35-86F8-90BC76CA6928}" type="slidenum">
+              <a:rPr lang="en-US" smtClean="0"/>
+              <a:t>10</a:t>
             </a:fld>
-            <a:endParaRPr/>
+            <a:endParaRPr lang="en-US"/>
           </a:p>
         </p:txBody>
       </p:sp>
     </p:spTree>
+    <p:extLst>
+      <p:ext uri="{BB962C8B-B14F-4D97-AF65-F5344CB8AC3E}">
+        <p14:creationId xmlns:p14="http://schemas.microsoft.com/office/powerpoint/2010/main" val="4135394685"/>
+      </p:ext>
+    </p:extLst>
   </p:cSld>
   <p:clrMapOvr>
     <a:masterClrMapping/>
@@ -2028,7 +2153,7 @@
       </p:grpSpPr>
       <p:sp>
         <p:nvSpPr>
-          <p:cNvPr id="168" name="PlaceHolder 1"/>
+          <p:cNvPr id="166" name="PlaceHolder 1"/>
           <p:cNvSpPr>
             <a:spLocks noGrp="1"/>
           </p:cNvSpPr>
@@ -2058,29 +2183,15 @@
             </a:pPr>
             <a:r>
               <a:rPr lang="en-US"/>
-              <a:t>Mention how startup scan compares file contents to detect differences between the files; still revisions changes</a:t>
-            </a:r>
-            <a:endParaRPr/>
-          </a:p>
-          <a:p>
-            <a:pPr>
-              <a:lnSpc>
-                <a:spcPct val="100000"/>
-              </a:lnSpc>
-              <a:buFont typeface="Arial"/>
-              <a:buChar char="•"/>
-            </a:pPr>
-            <a:r>
-              <a:rPr lang="en-US"/>
-              <a:t>Trim feature disabled by default; removes files older than a user specified number of days</a:t>
-            </a:r>
-            <a:endParaRPr/>
-          </a:p>
-        </p:txBody>
-      </p:sp>
-      <p:sp>
-        <p:nvSpPr>
-          <p:cNvPr id="169" name="CustomShape 2"/>
+              <a:t>Point out parts of this dialog</a:t>
+            </a:r>
+            <a:endParaRPr/>
+          </a:p>
+        </p:txBody>
+      </p:sp>
+      <p:sp>
+        <p:nvSpPr>
+          <p:cNvPr id="167" name="CustomShape 2"/>
           <p:cNvSpPr/>
           <p:nvPr/>
         </p:nvSpPr>
@@ -2106,7 +2217,7 @@
                 <a:spcPct val="100000"/>
               </a:lnSpc>
             </a:pPr>
-            <a:fld id="{096FD3AC-B4A2-4AE5-93A8-1C5DF2FDA5C7}" type="slidenum">
+            <a:fld id="{4E18DAAC-2076-4359-8E01-25007055AA73}" type="slidenum">
               <a:rPr lang="en-US" sz="1200">
                 <a:solidFill>
                   <a:srgbClr val="000000"/>
@@ -2114,7 +2225,7 @@
                 <a:latin typeface="+mn-lt"/>
                 <a:ea typeface="+mn-ea"/>
               </a:rPr>
-              <a:t>12</a:t>
+              <a:t>11</a:t>
             </a:fld>
             <a:endParaRPr/>
           </a:p>
@@ -6510,14 +6621,14 @@
       </p:grpSpPr>
       <p:sp>
         <p:nvSpPr>
-          <p:cNvPr id="114" name="CustomShape 1"/>
+          <p:cNvPr id="115" name="CustomShape 2"/>
           <p:cNvSpPr/>
           <p:nvPr/>
         </p:nvSpPr>
         <p:spPr>
           <a:xfrm>
-            <a:off x="251640" y="908640"/>
-            <a:ext cx="8712360" cy="2951640"/>
+            <a:off x="1371600" y="3886200"/>
+            <a:ext cx="6400080" cy="1751760"/>
           </a:xfrm>
           <a:prstGeom prst="rect">
             <a:avLst/>
@@ -6528,20 +6639,8 @@
           </a:ln>
         </p:spPr>
         <p:txBody>
-          <a:bodyPr lIns="90000" tIns="45000" rIns="90000" bIns="45000" anchor="ctr"/>
-          <a:lstStyle/>
-          <a:p>
-            <a:r>
-              <a:rPr lang="en-US" sz="8000" b="1">
-                <a:solidFill>
-                  <a:srgbClr val="000000"/>
-                </a:solidFill>
-                <a:latin typeface="Calibri"/>
-              </a:rPr>
-              <a:t>FBMS</a:t>
-            </a:r>
-            <a:endParaRPr/>
-          </a:p>
+          <a:bodyPr lIns="90000" tIns="45000" rIns="90000" bIns="45000"/>
+          <a:lstStyle/>
           <a:p>
             <a:pPr algn="ctr">
               <a:lnSpc>
@@ -6549,120 +6648,7 @@
               </a:lnSpc>
             </a:pPr>
             <a:r>
-              <a:rPr lang="en-US" sz="3600">
-                <a:solidFill>
-                  <a:srgbClr val="000000"/>
-                </a:solidFill>
-                <a:latin typeface="Calibri"/>
-              </a:rPr>
-              <a:t>the </a:t>
-            </a:r>
-            <a:r>
-              <a:rPr lang="en-US" sz="3600" b="1">
-                <a:solidFill>
-                  <a:srgbClr val="000000"/>
-                </a:solidFill>
-                <a:latin typeface="Calibri"/>
-              </a:rPr>
-              <a:t>F</a:t>
-            </a:r>
-            <a:r>
-              <a:rPr lang="en-US" sz="3600">
-                <a:solidFill>
-                  <a:srgbClr val="000000"/>
-                </a:solidFill>
-                <a:latin typeface="Calibri"/>
-              </a:rPr>
-              <a:t>ile </a:t>
-            </a:r>
-            <a:r>
-              <a:rPr lang="en-US" sz="3600" b="1">
-                <a:solidFill>
-                  <a:srgbClr val="000000"/>
-                </a:solidFill>
-                <a:latin typeface="Calibri"/>
-              </a:rPr>
-              <a:t>B</a:t>
-            </a:r>
-            <a:r>
-              <a:rPr lang="en-US" sz="3600">
-                <a:solidFill>
-                  <a:srgbClr val="000000"/>
-                </a:solidFill>
-                <a:latin typeface="Calibri"/>
-              </a:rPr>
-              <a:t>ackup and </a:t>
-            </a:r>
-            <a:r>
-              <a:rPr lang="en-US" sz="3600" b="1">
-                <a:solidFill>
-                  <a:srgbClr val="000000"/>
-                </a:solidFill>
-                <a:latin typeface="Calibri"/>
-              </a:rPr>
-              <a:t>M</a:t>
-            </a:r>
-            <a:r>
-              <a:rPr lang="en-US" sz="3600">
-                <a:solidFill>
-                  <a:srgbClr val="000000"/>
-                </a:solidFill>
-                <a:latin typeface="Calibri"/>
-              </a:rPr>
-              <a:t>anagement </a:t>
-            </a:r>
-            <a:r>
-              <a:rPr lang="en-US" sz="3600" b="1">
-                <a:solidFill>
-                  <a:srgbClr val="000000"/>
-                </a:solidFill>
-                <a:latin typeface="Calibri"/>
-              </a:rPr>
-              <a:t>S</a:t>
-            </a:r>
-            <a:r>
-              <a:rPr lang="en-US" sz="3600">
-                <a:solidFill>
-                  <a:srgbClr val="000000"/>
-                </a:solidFill>
-                <a:latin typeface="Calibri"/>
-              </a:rPr>
-              <a:t>ystem</a:t>
-            </a:r>
-            <a:endParaRPr/>
-          </a:p>
-        </p:txBody>
-      </p:sp>
-      <p:sp>
-        <p:nvSpPr>
-          <p:cNvPr id="115" name="CustomShape 2"/>
-          <p:cNvSpPr/>
-          <p:nvPr/>
-        </p:nvSpPr>
-        <p:spPr>
-          <a:xfrm>
-            <a:off x="1371600" y="3886200"/>
-            <a:ext cx="6400080" cy="1751760"/>
-          </a:xfrm>
-          <a:prstGeom prst="rect">
-            <a:avLst/>
-          </a:prstGeom>
-          <a:noFill/>
-          <a:ln>
-            <a:noFill/>
-          </a:ln>
-        </p:spPr>
-        <p:txBody>
-          <a:bodyPr lIns="90000" tIns="45000" rIns="90000" bIns="45000"/>
-          <a:lstStyle/>
-          <a:p>
-            <a:pPr algn="ctr">
-              <a:lnSpc>
-                <a:spcPct val="100000"/>
-              </a:lnSpc>
-            </a:pPr>
-            <a:r>
-              <a:rPr lang="en-US" sz="3200">
+              <a:rPr lang="en-US" sz="3200" dirty="0">
                 <a:solidFill>
                   <a:srgbClr val="8B8B8B"/>
                 </a:solidFill>
@@ -6670,7 +6656,7 @@
               </a:rPr>
               <a:t>Group 06:</a:t>
             </a:r>
-            <a:endParaRPr/>
+            <a:endParaRPr dirty="0"/>
           </a:p>
           <a:p>
             <a:pPr algn="ctr">
@@ -6679,18 +6665,95 @@
               </a:lnSpc>
             </a:pPr>
             <a:r>
-              <a:rPr lang="en-US" sz="3200">
+              <a:rPr lang="en-US" sz="3200" dirty="0">
                 <a:solidFill>
                   <a:srgbClr val="8B8B8B"/>
                 </a:solidFill>
                 <a:latin typeface="Calibri"/>
               </a:rPr>
-              <a:t>Hoffert, Tao, Butler, Rizvi, Alsharif</a:t>
-            </a:r>
-            <a:endParaRPr/>
-          </a:p>
-        </p:txBody>
-      </p:sp>
+              <a:t>Hoffert, Tao, Butler, Rizvi, </a:t>
+            </a:r>
+            <a:r>
+              <a:rPr lang="en-US" sz="3200" dirty="0" err="1">
+                <a:solidFill>
+                  <a:srgbClr val="8B8B8B"/>
+                </a:solidFill>
+                <a:latin typeface="Calibri"/>
+              </a:rPr>
+              <a:t>Alsharif</a:t>
+            </a:r>
+            <a:endParaRPr dirty="0"/>
+          </a:p>
+        </p:txBody>
+      </p:sp>
+      <p:pic>
+        <p:nvPicPr>
+          <p:cNvPr id="4" name="Picture 1"/>
+          <p:cNvPicPr>
+            <a:picLocks noChangeAspect="1" noChangeArrowheads="1"/>
+          </p:cNvPicPr>
+          <p:nvPr/>
+        </p:nvPicPr>
+        <p:blipFill>
+          <a:blip r:embed="rId2">
+            <a:extLst>
+              <a:ext uri="{28A0092B-C50C-407E-A947-70E740481C1C}">
+                <a14:useLocalDpi xmlns:a14="http://schemas.microsoft.com/office/drawing/2010/main" val="0"/>
+              </a:ext>
+            </a:extLst>
+          </a:blip>
+          <a:srcRect/>
+          <a:stretch>
+            <a:fillRect/>
+          </a:stretch>
+        </p:blipFill>
+        <p:spPr bwMode="auto">
+          <a:xfrm>
+            <a:off x="-285750" y="895350"/>
+            <a:ext cx="9264650" cy="3043238"/>
+          </a:xfrm>
+          <a:prstGeom prst="rect">
+            <a:avLst/>
+          </a:prstGeom>
+          <a:noFill/>
+          <a:ln>
+            <a:noFill/>
+          </a:ln>
+          <a:effectLst/>
+          <a:extLst>
+            <a:ext uri="{909E8E84-426E-40DD-AFC4-6F175D3DCCD1}">
+              <a14:hiddenFill xmlns:a14="http://schemas.microsoft.com/office/drawing/2010/main">
+                <a:blipFill dpi="0" rotWithShape="0">
+                  <a:blip/>
+                  <a:srcRect/>
+                  <a:stretch>
+                    <a:fillRect/>
+                  </a:stretch>
+                </a:blipFill>
+              </a14:hiddenFill>
+            </a:ext>
+            <a:ext uri="{91240B29-F687-4F45-9708-019B960494DF}">
+              <a14:hiddenLine xmlns:a14="http://schemas.microsoft.com/office/drawing/2010/main" w="9525" cap="flat">
+                <a:solidFill>
+                  <a:srgbClr val="3465AF"/>
+                </a:solidFill>
+                <a:round/>
+                <a:headEnd/>
+                <a:tailEnd/>
+              </a14:hiddenLine>
+            </a:ext>
+            <a:ext uri="{AF507438-7753-43E0-B8FC-AC1667EBCBE1}">
+              <a14:hiddenEffects xmlns:a14="http://schemas.microsoft.com/office/drawing/2010/main">
+                <a:effectLst>
+                  <a:outerShdw dist="35921" dir="2700000" algn="ctr" rotWithShape="0">
+                    <a:srgbClr val="808080"/>
+                  </a:outerShdw>
+                </a:effectLst>
+              </a14:hiddenEffects>
+            </a:ext>
+          </a:extLst>
+        </p:spPr>
+      </p:pic>
     </p:spTree>
   </p:cSld>
   <p:clrMapOvr>
@@ -6726,31 +6789,6 @@
           <p:nvPr/>
         </p:nvPicPr>
         <p:blipFill>
-          <a:blip r:embed="rId2"/>
-          <a:stretch>
-            <a:fillRect/>
-          </a:stretch>
-        </p:blipFill>
-        <p:spPr>
-          <a:xfrm>
-            <a:off x="136818" y="1340768"/>
-            <a:ext cx="4434822" cy="2088232"/>
-          </a:xfrm>
-          <a:prstGeom prst="rect">
-            <a:avLst/>
-          </a:prstGeom>
-          <a:ln>
-            <a:noFill/>
-          </a:ln>
-        </p:spPr>
-      </p:pic>
-      <p:pic>
-        <p:nvPicPr>
-          <p:cNvPr id="133" name="Picture 132"/>
-          <p:cNvPicPr/>
-          <p:nvPr/>
-        </p:nvPicPr>
-        <p:blipFill>
           <a:blip r:embed="rId3"/>
           <a:stretch>
             <a:fillRect/>
@@ -6758,8 +6796,8 @@
         </p:blipFill>
         <p:spPr>
           <a:xfrm>
-            <a:off x="4571640" y="1340768"/>
-            <a:ext cx="4465573" cy="2088232"/>
+            <a:off x="136818" y="1340768"/>
+            <a:ext cx="4434822" cy="2088232"/>
           </a:xfrm>
           <a:prstGeom prst="rect">
             <a:avLst/>
@@ -6771,7 +6809,7 @@
       </p:pic>
       <p:pic>
         <p:nvPicPr>
-          <p:cNvPr id="134" name="Picture 133"/>
+          <p:cNvPr id="133" name="Picture 132"/>
           <p:cNvPicPr/>
           <p:nvPr/>
         </p:nvPicPr>
@@ -6783,8 +6821,8 @@
         </p:blipFill>
         <p:spPr>
           <a:xfrm>
-            <a:off x="1091952" y="2852936"/>
-            <a:ext cx="7200800" cy="3312368"/>
+            <a:off x="4571640" y="1340768"/>
+            <a:ext cx="4465573" cy="2088232"/>
           </a:xfrm>
           <a:prstGeom prst="rect">
             <a:avLst/>
@@ -6794,47 +6832,31 @@
           </a:ln>
         </p:spPr>
       </p:pic>
-      <p:sp>
-        <p:nvSpPr>
-          <p:cNvPr id="6" name="CustomShape 1"/>
-          <p:cNvSpPr/>
+      <p:pic>
+        <p:nvPicPr>
+          <p:cNvPr id="134" name="Picture 133"/>
+          <p:cNvPicPr/>
           <p:nvPr/>
-        </p:nvSpPr>
-        <p:spPr>
-          <a:xfrm>
-            <a:off x="457200" y="274680"/>
-            <a:ext cx="8228880" cy="1142280"/>
-          </a:xfrm>
-          <a:prstGeom prst="rect">
-            <a:avLst/>
-          </a:prstGeom>
-          <a:noFill/>
+        </p:nvPicPr>
+        <p:blipFill>
+          <a:blip r:embed="rId5"/>
+          <a:stretch>
+            <a:fillRect/>
+          </a:stretch>
+        </p:blipFill>
+        <p:spPr>
+          <a:xfrm>
+            <a:off x="1091952" y="2852936"/>
+            <a:ext cx="7200800" cy="3312368"/>
+          </a:xfrm>
+          <a:prstGeom prst="rect">
+            <a:avLst/>
+          </a:prstGeom>
           <a:ln>
             <a:noFill/>
           </a:ln>
         </p:spPr>
-        <p:txBody>
-          <a:bodyPr lIns="90000" tIns="45000" rIns="90000" bIns="45000" anchor="ctr"/>
-          <a:lstStyle/>
-          <a:p>
-            <a:pPr algn="ctr">
-              <a:lnSpc>
-                <a:spcPct val="100000"/>
-              </a:lnSpc>
-            </a:pPr>
-            <a:r>
-              <a:rPr lang="en-US" sz="4400" dirty="0">
-                <a:solidFill>
-                  <a:srgbClr val="000000"/>
-                </a:solidFill>
-                <a:latin typeface="Calibri"/>
-              </a:rPr>
-              <a:t>Achieved so far</a:t>
-            </a:r>
-            <a:endParaRPr dirty="0"/>
-          </a:p>
-        </p:txBody>
-      </p:sp>
+      </p:pic>
       <p:sp>
         <p:nvSpPr>
           <p:cNvPr id="7" name="CustomShape 2"/>
@@ -6885,6 +6907,74 @@
           </a:p>
         </p:txBody>
       </p:sp>
+      <p:pic>
+        <p:nvPicPr>
+          <p:cNvPr id="9" name="Picture 1"/>
+          <p:cNvPicPr>
+            <a:picLocks noChangeAspect="1" noChangeArrowheads="1"/>
+          </p:cNvPicPr>
+          <p:nvPr/>
+        </p:nvPicPr>
+        <p:blipFill>
+          <a:blip r:embed="rId6">
+            <a:extLst>
+              <a:ext uri="{28A0092B-C50C-407E-A947-70E740481C1C}">
+                <a14:useLocalDpi xmlns:a14="http://schemas.microsoft.com/office/drawing/2010/main" val="0"/>
+              </a:ext>
+            </a:extLst>
+          </a:blip>
+          <a:srcRect/>
+          <a:stretch>
+            <a:fillRect/>
+          </a:stretch>
+        </p:blipFill>
+        <p:spPr bwMode="auto">
+          <a:xfrm>
+            <a:off x="323528" y="44624"/>
+            <a:ext cx="8229600" cy="1146175"/>
+          </a:xfrm>
+          <a:prstGeom prst="rect">
+            <a:avLst/>
+          </a:prstGeom>
+          <a:noFill/>
+          <a:ln>
+            <a:noFill/>
+          </a:ln>
+          <a:effectLst/>
+          <a:extLst>
+            <a:ext uri="{909E8E84-426E-40DD-AFC4-6F175D3DCCD1}">
+              <a14:hiddenFill xmlns:a14="http://schemas.microsoft.com/office/drawing/2010/main">
+                <a:blipFill dpi="0" rotWithShape="0">
+                  <a:blip/>
+                  <a:srcRect/>
+                  <a:stretch>
+                    <a:fillRect/>
+                  </a:stretch>
+                </a:blipFill>
+              </a14:hiddenFill>
+            </a:ext>
+            <a:ext uri="{91240B29-F687-4F45-9708-019B960494DF}">
+              <a14:hiddenLine xmlns:a14="http://schemas.microsoft.com/office/drawing/2010/main" w="9525" cap="flat">
+                <a:solidFill>
+                  <a:srgbClr val="3465AF"/>
+                </a:solidFill>
+                <a:round/>
+                <a:headEnd/>
+                <a:tailEnd/>
+              </a14:hiddenLine>
+            </a:ext>
+            <a:ext uri="{AF507438-7753-43E0-B8FC-AC1667EBCBE1}">
+              <a14:hiddenEffects xmlns:a14="http://schemas.microsoft.com/office/drawing/2010/main">
+                <a:effectLst>
+                  <a:outerShdw dist="35921" dir="2700000" algn="ctr" rotWithShape="0">
+                    <a:srgbClr val="808080"/>
+                  </a:outerShdw>
+                </a:effectLst>
+              </a14:hiddenEffects>
+            </a:ext>
+          </a:extLst>
+        </p:spPr>
+      </p:pic>
     </p:spTree>
   </p:cSld>
   <p:clrMapOvr>
@@ -6942,47 +7032,6 @@
       </p:grpSpPr>
       <p:sp>
         <p:nvSpPr>
-          <p:cNvPr id="135" name="CustomShape 1"/>
-          <p:cNvSpPr/>
-          <p:nvPr/>
-        </p:nvSpPr>
-        <p:spPr>
-          <a:xfrm>
-            <a:off x="457200" y="274680"/>
-            <a:ext cx="8228880" cy="1142280"/>
-          </a:xfrm>
-          <a:prstGeom prst="rect">
-            <a:avLst/>
-          </a:prstGeom>
-          <a:noFill/>
-          <a:ln>
-            <a:noFill/>
-          </a:ln>
-        </p:spPr>
-        <p:txBody>
-          <a:bodyPr lIns="90000" tIns="45000" rIns="90000" bIns="45000" anchor="ctr"/>
-          <a:lstStyle/>
-          <a:p>
-            <a:pPr algn="ctr">
-              <a:lnSpc>
-                <a:spcPct val="100000"/>
-              </a:lnSpc>
-            </a:pPr>
-            <a:r>
-              <a:rPr lang="en-US" sz="4400">
-                <a:solidFill>
-                  <a:srgbClr val="000000"/>
-                </a:solidFill>
-                <a:latin typeface="Calibri"/>
-              </a:rPr>
-              <a:t>Achieved so far</a:t>
-            </a:r>
-            <a:endParaRPr/>
-          </a:p>
-        </p:txBody>
-      </p:sp>
-      <p:sp>
-        <p:nvSpPr>
           <p:cNvPr id="136" name="CustomShape 2"/>
           <p:cNvSpPr/>
           <p:nvPr/>
@@ -7045,6 +7094,74 @@
           <a:ln>
             <a:noFill/>
           </a:ln>
+        </p:spPr>
+      </p:pic>
+      <p:pic>
+        <p:nvPicPr>
+          <p:cNvPr id="6" name="Picture 1"/>
+          <p:cNvPicPr>
+            <a:picLocks noChangeAspect="1" noChangeArrowheads="1"/>
+          </p:cNvPicPr>
+          <p:nvPr/>
+        </p:nvPicPr>
+        <p:blipFill>
+          <a:blip r:embed="rId4">
+            <a:extLst>
+              <a:ext uri="{28A0092B-C50C-407E-A947-70E740481C1C}">
+                <a14:useLocalDpi xmlns:a14="http://schemas.microsoft.com/office/drawing/2010/main" val="0"/>
+              </a:ext>
+            </a:extLst>
+          </a:blip>
+          <a:srcRect/>
+          <a:stretch>
+            <a:fillRect/>
+          </a:stretch>
+        </p:blipFill>
+        <p:spPr bwMode="auto">
+          <a:xfrm>
+            <a:off x="323528" y="44624"/>
+            <a:ext cx="8229600" cy="1146175"/>
+          </a:xfrm>
+          <a:prstGeom prst="rect">
+            <a:avLst/>
+          </a:prstGeom>
+          <a:noFill/>
+          <a:ln>
+            <a:noFill/>
+          </a:ln>
+          <a:effectLst/>
+          <a:extLst>
+            <a:ext uri="{909E8E84-426E-40DD-AFC4-6F175D3DCCD1}">
+              <a14:hiddenFill xmlns:a14="http://schemas.microsoft.com/office/drawing/2010/main">
+                <a:blipFill dpi="0" rotWithShape="0">
+                  <a:blip/>
+                  <a:srcRect/>
+                  <a:stretch>
+                    <a:fillRect/>
+                  </a:stretch>
+                </a:blipFill>
+              </a14:hiddenFill>
+            </a:ext>
+            <a:ext uri="{91240B29-F687-4F45-9708-019B960494DF}">
+              <a14:hiddenLine xmlns:a14="http://schemas.microsoft.com/office/drawing/2010/main" w="9525" cap="flat">
+                <a:solidFill>
+                  <a:srgbClr val="3465AF"/>
+                </a:solidFill>
+                <a:round/>
+                <a:headEnd/>
+                <a:tailEnd/>
+              </a14:hiddenLine>
+            </a:ext>
+            <a:ext uri="{AF507438-7753-43E0-B8FC-AC1667EBCBE1}">
+              <a14:hiddenEffects xmlns:a14="http://schemas.microsoft.com/office/drawing/2010/main">
+                <a:effectLst>
+                  <a:outerShdw dist="35921" dir="2700000" algn="ctr" rotWithShape="0">
+                    <a:srgbClr val="808080"/>
+                  </a:outerShdw>
+                </a:effectLst>
+              </a14:hiddenEffects>
+            </a:ext>
+          </a:extLst>
         </p:spPr>
       </p:pic>
     </p:spTree>
@@ -7104,47 +7221,6 @@
       </p:grpSpPr>
       <p:sp>
         <p:nvSpPr>
-          <p:cNvPr id="138" name="CustomShape 1"/>
-          <p:cNvSpPr/>
-          <p:nvPr/>
-        </p:nvSpPr>
-        <p:spPr>
-          <a:xfrm>
-            <a:off x="457200" y="274680"/>
-            <a:ext cx="8228880" cy="1142280"/>
-          </a:xfrm>
-          <a:prstGeom prst="rect">
-            <a:avLst/>
-          </a:prstGeom>
-          <a:noFill/>
-          <a:ln>
-            <a:noFill/>
-          </a:ln>
-        </p:spPr>
-        <p:txBody>
-          <a:bodyPr lIns="90000" tIns="45000" rIns="90000" bIns="45000" anchor="ctr"/>
-          <a:lstStyle/>
-          <a:p>
-            <a:pPr algn="ctr">
-              <a:lnSpc>
-                <a:spcPct val="100000"/>
-              </a:lnSpc>
-            </a:pPr>
-            <a:r>
-              <a:rPr lang="en-US" sz="4400">
-                <a:solidFill>
-                  <a:srgbClr val="000000"/>
-                </a:solidFill>
-                <a:latin typeface="Calibri"/>
-              </a:rPr>
-              <a:t>Achieved so far</a:t>
-            </a:r>
-            <a:endParaRPr/>
-          </a:p>
-        </p:txBody>
-      </p:sp>
-      <p:sp>
-        <p:nvSpPr>
           <p:cNvPr id="139" name="CustomShape 2"/>
           <p:cNvSpPr/>
           <p:nvPr/>
@@ -7174,7 +7250,7 @@
               <a:buChar char="•"/>
             </a:pPr>
             <a:r>
-              <a:rPr lang="en-US" sz="3200">
+              <a:rPr lang="en-US" sz="3200" dirty="0">
                 <a:solidFill>
                   <a:srgbClr val="000000"/>
                 </a:solidFill>
@@ -7182,7 +7258,7 @@
               </a:rPr>
               <a:t>We’ve also added features such as a startup scan, which performs a one-time scan when the program is started up, allowing detection of changes made when the program was not running</a:t>
             </a:r>
-            <a:endParaRPr/>
+            <a:endParaRPr dirty="0"/>
           </a:p>
           <a:p>
             <a:pPr>
@@ -7193,7 +7269,7 @@
               <a:buChar char="•"/>
             </a:pPr>
             <a:r>
-              <a:rPr lang="en-US" sz="3200">
+              <a:rPr lang="en-US" sz="3200" dirty="0">
                 <a:solidFill>
                   <a:srgbClr val="000000"/>
                 </a:solidFill>
@@ -7201,7 +7277,7 @@
               </a:rPr>
               <a:t>The trim feature regularly removes files older than a user specified date</a:t>
             </a:r>
-            <a:endParaRPr/>
+            <a:endParaRPr dirty="0"/>
           </a:p>
           <a:p>
             <a:pPr>
@@ -7212,7 +7288,7 @@
               <a:buChar char="•"/>
             </a:pPr>
             <a:r>
-              <a:rPr lang="en-US" sz="3200">
+              <a:rPr lang="en-US" sz="3200" dirty="0">
                 <a:solidFill>
                   <a:srgbClr val="000000"/>
                 </a:solidFill>
@@ -7220,10 +7296,78 @@
               </a:rPr>
               <a:t>More than 525 revisions of content, bug fixes, and features</a:t>
             </a:r>
-            <a:endParaRPr/>
-          </a:p>
-        </p:txBody>
-      </p:sp>
+            <a:endParaRPr dirty="0"/>
+          </a:p>
+        </p:txBody>
+      </p:sp>
+      <p:pic>
+        <p:nvPicPr>
+          <p:cNvPr id="5" name="Picture 1"/>
+          <p:cNvPicPr>
+            <a:picLocks noChangeAspect="1" noChangeArrowheads="1"/>
+          </p:cNvPicPr>
+          <p:nvPr/>
+        </p:nvPicPr>
+        <p:blipFill>
+          <a:blip r:embed="rId3">
+            <a:extLst>
+              <a:ext uri="{28A0092B-C50C-407E-A947-70E740481C1C}">
+                <a14:useLocalDpi xmlns:a14="http://schemas.microsoft.com/office/drawing/2010/main" val="0"/>
+              </a:ext>
+            </a:extLst>
+          </a:blip>
+          <a:srcRect/>
+          <a:stretch>
+            <a:fillRect/>
+          </a:stretch>
+        </p:blipFill>
+        <p:spPr bwMode="auto">
+          <a:xfrm>
+            <a:off x="323528" y="44624"/>
+            <a:ext cx="8229600" cy="1146175"/>
+          </a:xfrm>
+          <a:prstGeom prst="rect">
+            <a:avLst/>
+          </a:prstGeom>
+          <a:noFill/>
+          <a:ln>
+            <a:noFill/>
+          </a:ln>
+          <a:effectLst/>
+          <a:extLst>
+            <a:ext uri="{909E8E84-426E-40DD-AFC4-6F175D3DCCD1}">
+              <a14:hiddenFill xmlns:a14="http://schemas.microsoft.com/office/drawing/2010/main">
+                <a:blipFill dpi="0" rotWithShape="0">
+                  <a:blip/>
+                  <a:srcRect/>
+                  <a:stretch>
+                    <a:fillRect/>
+                  </a:stretch>
+                </a:blipFill>
+              </a14:hiddenFill>
+            </a:ext>
+            <a:ext uri="{91240B29-F687-4F45-9708-019B960494DF}">
+              <a14:hiddenLine xmlns:a14="http://schemas.microsoft.com/office/drawing/2010/main" w="9525" cap="flat">
+                <a:solidFill>
+                  <a:srgbClr val="3465AF"/>
+                </a:solidFill>
+                <a:round/>
+                <a:headEnd/>
+                <a:tailEnd/>
+              </a14:hiddenLine>
+            </a:ext>
+            <a:ext uri="{AF507438-7753-43E0-B8FC-AC1667EBCBE1}">
+              <a14:hiddenEffects xmlns:a14="http://schemas.microsoft.com/office/drawing/2010/main">
+                <a:effectLst>
+                  <a:outerShdw dist="35921" dir="2700000" algn="ctr" rotWithShape="0">
+                    <a:srgbClr val="808080"/>
+                  </a:outerShdw>
+                </a:effectLst>
+              </a14:hiddenEffects>
+            </a:ext>
+          </a:extLst>
+        </p:spPr>
+      </p:pic>
     </p:spTree>
   </p:cSld>
   <p:clrMapOvr>
@@ -7281,47 +7425,6 @@
       </p:grpSpPr>
       <p:sp>
         <p:nvSpPr>
-          <p:cNvPr id="140" name="CustomShape 1"/>
-          <p:cNvSpPr/>
-          <p:nvPr/>
-        </p:nvSpPr>
-        <p:spPr>
-          <a:xfrm>
-            <a:off x="457200" y="274680"/>
-            <a:ext cx="8228880" cy="1142280"/>
-          </a:xfrm>
-          <a:prstGeom prst="rect">
-            <a:avLst/>
-          </a:prstGeom>
-          <a:noFill/>
-          <a:ln>
-            <a:noFill/>
-          </a:ln>
-        </p:spPr>
-        <p:txBody>
-          <a:bodyPr lIns="90000" tIns="45000" rIns="90000" bIns="45000" anchor="ctr"/>
-          <a:lstStyle/>
-          <a:p>
-            <a:pPr algn="ctr">
-              <a:lnSpc>
-                <a:spcPct val="100000"/>
-              </a:lnSpc>
-            </a:pPr>
-            <a:r>
-              <a:rPr lang="en-US" sz="4400">
-                <a:solidFill>
-                  <a:srgbClr val="000000"/>
-                </a:solidFill>
-                <a:latin typeface="Calibri"/>
-              </a:rPr>
-              <a:t>Challenges addressed</a:t>
-            </a:r>
-            <a:endParaRPr/>
-          </a:p>
-        </p:txBody>
-      </p:sp>
-      <p:sp>
-        <p:nvSpPr>
           <p:cNvPr id="141" name="CustomShape 2"/>
           <p:cNvSpPr/>
           <p:nvPr/>
@@ -7420,6 +7523,74 @@
           </a:p>
         </p:txBody>
       </p:sp>
+      <p:pic>
+        <p:nvPicPr>
+          <p:cNvPr id="5" name="Picture 1"/>
+          <p:cNvPicPr>
+            <a:picLocks noChangeAspect="1" noChangeArrowheads="1"/>
+          </p:cNvPicPr>
+          <p:nvPr/>
+        </p:nvPicPr>
+        <p:blipFill>
+          <a:blip r:embed="rId3">
+            <a:extLst>
+              <a:ext uri="{28A0092B-C50C-407E-A947-70E740481C1C}">
+                <a14:useLocalDpi xmlns:a14="http://schemas.microsoft.com/office/drawing/2010/main" val="0"/>
+              </a:ext>
+            </a:extLst>
+          </a:blip>
+          <a:srcRect/>
+          <a:stretch>
+            <a:fillRect/>
+          </a:stretch>
+        </p:blipFill>
+        <p:spPr bwMode="auto">
+          <a:xfrm>
+            <a:off x="456480" y="34702"/>
+            <a:ext cx="8229600" cy="1146175"/>
+          </a:xfrm>
+          <a:prstGeom prst="rect">
+            <a:avLst/>
+          </a:prstGeom>
+          <a:noFill/>
+          <a:ln>
+            <a:noFill/>
+          </a:ln>
+          <a:effectLst/>
+          <a:extLst>
+            <a:ext uri="{909E8E84-426E-40DD-AFC4-6F175D3DCCD1}">
+              <a14:hiddenFill xmlns:a14="http://schemas.microsoft.com/office/drawing/2010/main">
+                <a:blipFill dpi="0" rotWithShape="0">
+                  <a:blip/>
+                  <a:srcRect/>
+                  <a:stretch>
+                    <a:fillRect/>
+                  </a:stretch>
+                </a:blipFill>
+              </a14:hiddenFill>
+            </a:ext>
+            <a:ext uri="{91240B29-F687-4F45-9708-019B960494DF}">
+              <a14:hiddenLine xmlns:a14="http://schemas.microsoft.com/office/drawing/2010/main" w="9525" cap="flat">
+                <a:solidFill>
+                  <a:srgbClr val="3465AF"/>
+                </a:solidFill>
+                <a:round/>
+                <a:headEnd/>
+                <a:tailEnd/>
+              </a14:hiddenLine>
+            </a:ext>
+            <a:ext uri="{AF507438-7753-43E0-B8FC-AC1667EBCBE1}">
+              <a14:hiddenEffects xmlns:a14="http://schemas.microsoft.com/office/drawing/2010/main">
+                <a:effectLst>
+                  <a:outerShdw dist="35921" dir="2700000" algn="ctr" rotWithShape="0">
+                    <a:srgbClr val="808080"/>
+                  </a:outerShdw>
+                </a:effectLst>
+              </a14:hiddenEffects>
+            </a:ext>
+          </a:extLst>
+        </p:spPr>
+      </p:pic>
     </p:spTree>
   </p:cSld>
   <p:clrMapOvr>
@@ -7450,47 +7621,6 @@
       </p:grpSpPr>
       <p:sp>
         <p:nvSpPr>
-          <p:cNvPr id="142" name="CustomShape 1"/>
-          <p:cNvSpPr/>
-          <p:nvPr/>
-        </p:nvSpPr>
-        <p:spPr>
-          <a:xfrm>
-            <a:off x="457200" y="274680"/>
-            <a:ext cx="8228880" cy="1142280"/>
-          </a:xfrm>
-          <a:prstGeom prst="rect">
-            <a:avLst/>
-          </a:prstGeom>
-          <a:noFill/>
-          <a:ln>
-            <a:noFill/>
-          </a:ln>
-        </p:spPr>
-        <p:txBody>
-          <a:bodyPr lIns="90000" tIns="45000" rIns="90000" bIns="45000" anchor="ctr"/>
-          <a:lstStyle/>
-          <a:p>
-            <a:pPr algn="ctr">
-              <a:lnSpc>
-                <a:spcPct val="100000"/>
-              </a:lnSpc>
-            </a:pPr>
-            <a:r>
-              <a:rPr lang="en-US" sz="4400">
-                <a:solidFill>
-                  <a:srgbClr val="000000"/>
-                </a:solidFill>
-                <a:latin typeface="Calibri"/>
-              </a:rPr>
-              <a:t>Challenges addressed</a:t>
-            </a:r>
-            <a:endParaRPr/>
-          </a:p>
-        </p:txBody>
-      </p:sp>
-      <p:sp>
-        <p:nvSpPr>
           <p:cNvPr id="143" name="CustomShape 2"/>
           <p:cNvSpPr/>
           <p:nvPr/>
@@ -7608,6 +7738,74 @@
           </a:p>
         </p:txBody>
       </p:sp>
+      <p:pic>
+        <p:nvPicPr>
+          <p:cNvPr id="5" name="Picture 1"/>
+          <p:cNvPicPr>
+            <a:picLocks noChangeAspect="1" noChangeArrowheads="1"/>
+          </p:cNvPicPr>
+          <p:nvPr/>
+        </p:nvPicPr>
+        <p:blipFill>
+          <a:blip r:embed="rId3">
+            <a:extLst>
+              <a:ext uri="{28A0092B-C50C-407E-A947-70E740481C1C}">
+                <a14:useLocalDpi xmlns:a14="http://schemas.microsoft.com/office/drawing/2010/main" val="0"/>
+              </a:ext>
+            </a:extLst>
+          </a:blip>
+          <a:srcRect/>
+          <a:stretch>
+            <a:fillRect/>
+          </a:stretch>
+        </p:blipFill>
+        <p:spPr bwMode="auto">
+          <a:xfrm>
+            <a:off x="456480" y="34702"/>
+            <a:ext cx="8229600" cy="1146175"/>
+          </a:xfrm>
+          <a:prstGeom prst="rect">
+            <a:avLst/>
+          </a:prstGeom>
+          <a:noFill/>
+          <a:ln>
+            <a:noFill/>
+          </a:ln>
+          <a:effectLst/>
+          <a:extLst>
+            <a:ext uri="{909E8E84-426E-40DD-AFC4-6F175D3DCCD1}">
+              <a14:hiddenFill xmlns:a14="http://schemas.microsoft.com/office/drawing/2010/main">
+                <a:blipFill dpi="0" rotWithShape="0">
+                  <a:blip/>
+                  <a:srcRect/>
+                  <a:stretch>
+                    <a:fillRect/>
+                  </a:stretch>
+                </a:blipFill>
+              </a14:hiddenFill>
+            </a:ext>
+            <a:ext uri="{91240B29-F687-4F45-9708-019B960494DF}">
+              <a14:hiddenLine xmlns:a14="http://schemas.microsoft.com/office/drawing/2010/main" w="9525" cap="flat">
+                <a:solidFill>
+                  <a:srgbClr val="3465AF"/>
+                </a:solidFill>
+                <a:round/>
+                <a:headEnd/>
+                <a:tailEnd/>
+              </a14:hiddenLine>
+            </a:ext>
+            <a:ext uri="{AF507438-7753-43E0-B8FC-AC1667EBCBE1}">
+              <a14:hiddenEffects xmlns:a14="http://schemas.microsoft.com/office/drawing/2010/main">
+                <a:effectLst>
+                  <a:outerShdw dist="35921" dir="2700000" algn="ctr" rotWithShape="0">
+                    <a:srgbClr val="808080"/>
+                  </a:outerShdw>
+                </a:effectLst>
+              </a14:hiddenEffects>
+            </a:ext>
+          </a:extLst>
+        </p:spPr>
+      </p:pic>
     </p:spTree>
   </p:cSld>
   <p:clrMapOvr>
@@ -7665,47 +7863,6 @@
       </p:grpSpPr>
       <p:sp>
         <p:nvSpPr>
-          <p:cNvPr id="144" name="CustomShape 1"/>
-          <p:cNvSpPr/>
-          <p:nvPr/>
-        </p:nvSpPr>
-        <p:spPr>
-          <a:xfrm>
-            <a:off x="457200" y="274680"/>
-            <a:ext cx="8228880" cy="1142280"/>
-          </a:xfrm>
-          <a:prstGeom prst="rect">
-            <a:avLst/>
-          </a:prstGeom>
-          <a:noFill/>
-          <a:ln>
-            <a:noFill/>
-          </a:ln>
-        </p:spPr>
-        <p:txBody>
-          <a:bodyPr lIns="90000" tIns="45000" rIns="90000" bIns="45000" anchor="ctr"/>
-          <a:lstStyle/>
-          <a:p>
-            <a:pPr algn="ctr">
-              <a:lnSpc>
-                <a:spcPct val="100000"/>
-              </a:lnSpc>
-            </a:pPr>
-            <a:r>
-              <a:rPr lang="en-US" sz="4400">
-                <a:solidFill>
-                  <a:srgbClr val="000000"/>
-                </a:solidFill>
-                <a:latin typeface="Calibri"/>
-              </a:rPr>
-              <a:t>Other</a:t>
-            </a:r>
-            <a:endParaRPr/>
-          </a:p>
-        </p:txBody>
-      </p:sp>
-      <p:sp>
-        <p:nvSpPr>
           <p:cNvPr id="145" name="CustomShape 2"/>
           <p:cNvSpPr/>
           <p:nvPr/>
@@ -7785,6 +7942,74 @@
           </a:p>
         </p:txBody>
       </p:sp>
+      <p:pic>
+        <p:nvPicPr>
+          <p:cNvPr id="4" name="Picture 1"/>
+          <p:cNvPicPr>
+            <a:picLocks noChangeAspect="1" noChangeArrowheads="1"/>
+          </p:cNvPicPr>
+          <p:nvPr/>
+        </p:nvPicPr>
+        <p:blipFill>
+          <a:blip r:embed="rId3">
+            <a:extLst>
+              <a:ext uri="{28A0092B-C50C-407E-A947-70E740481C1C}">
+                <a14:useLocalDpi xmlns:a14="http://schemas.microsoft.com/office/drawing/2010/main" val="0"/>
+              </a:ext>
+            </a:extLst>
+          </a:blip>
+          <a:srcRect/>
+          <a:stretch>
+            <a:fillRect/>
+          </a:stretch>
+        </p:blipFill>
+        <p:spPr bwMode="auto">
+          <a:xfrm>
+            <a:off x="228262" y="12674"/>
+            <a:ext cx="8229600" cy="1146175"/>
+          </a:xfrm>
+          <a:prstGeom prst="rect">
+            <a:avLst/>
+          </a:prstGeom>
+          <a:noFill/>
+          <a:ln>
+            <a:noFill/>
+          </a:ln>
+          <a:effectLst/>
+          <a:extLst>
+            <a:ext uri="{909E8E84-426E-40DD-AFC4-6F175D3DCCD1}">
+              <a14:hiddenFill xmlns:a14="http://schemas.microsoft.com/office/drawing/2010/main">
+                <a:blipFill dpi="0" rotWithShape="0">
+                  <a:blip/>
+                  <a:srcRect/>
+                  <a:stretch>
+                    <a:fillRect/>
+                  </a:stretch>
+                </a:blipFill>
+              </a14:hiddenFill>
+            </a:ext>
+            <a:ext uri="{91240B29-F687-4F45-9708-019B960494DF}">
+              <a14:hiddenLine xmlns:a14="http://schemas.microsoft.com/office/drawing/2010/main" w="9525" cap="flat">
+                <a:solidFill>
+                  <a:srgbClr val="3465AF"/>
+                </a:solidFill>
+                <a:round/>
+                <a:headEnd/>
+                <a:tailEnd/>
+              </a14:hiddenLine>
+            </a:ext>
+            <a:ext uri="{AF507438-7753-43E0-B8FC-AC1667EBCBE1}">
+              <a14:hiddenEffects xmlns:a14="http://schemas.microsoft.com/office/drawing/2010/main">
+                <a:effectLst>
+                  <a:outerShdw dist="35921" dir="2700000" algn="ctr" rotWithShape="0">
+                    <a:srgbClr val="808080"/>
+                  </a:outerShdw>
+                </a:effectLst>
+              </a14:hiddenEffects>
+            </a:ext>
+          </a:extLst>
+        </p:spPr>
+      </p:pic>
     </p:spTree>
   </p:cSld>
   <p:clrMapOvr>
@@ -7842,47 +8067,6 @@
       </p:grpSpPr>
       <p:sp>
         <p:nvSpPr>
-          <p:cNvPr id="146" name="CustomShape 1"/>
-          <p:cNvSpPr/>
-          <p:nvPr/>
-        </p:nvSpPr>
-        <p:spPr>
-          <a:xfrm>
-            <a:off x="457200" y="274680"/>
-            <a:ext cx="8228880" cy="1142280"/>
-          </a:xfrm>
-          <a:prstGeom prst="rect">
-            <a:avLst/>
-          </a:prstGeom>
-          <a:noFill/>
-          <a:ln>
-            <a:noFill/>
-          </a:ln>
-        </p:spPr>
-        <p:txBody>
-          <a:bodyPr lIns="90000" tIns="45000" rIns="90000" bIns="45000" anchor="ctr"/>
-          <a:lstStyle/>
-          <a:p>
-            <a:pPr algn="ctr">
-              <a:lnSpc>
-                <a:spcPct val="100000"/>
-              </a:lnSpc>
-            </a:pPr>
-            <a:r>
-              <a:rPr lang="en-US" sz="4400">
-                <a:solidFill>
-                  <a:srgbClr val="000000"/>
-                </a:solidFill>
-                <a:latin typeface="Calibri"/>
-              </a:rPr>
-              <a:t>Other</a:t>
-            </a:r>
-            <a:endParaRPr/>
-          </a:p>
-        </p:txBody>
-      </p:sp>
-      <p:sp>
-        <p:nvSpPr>
           <p:cNvPr id="147" name="CustomShape 2"/>
           <p:cNvSpPr/>
           <p:nvPr/>
@@ -8157,6 +8341,74 @@
           </a:p>
         </p:txBody>
       </p:sp>
+      <p:pic>
+        <p:nvPicPr>
+          <p:cNvPr id="7" name="Picture 1"/>
+          <p:cNvPicPr>
+            <a:picLocks noChangeAspect="1" noChangeArrowheads="1"/>
+          </p:cNvPicPr>
+          <p:nvPr/>
+        </p:nvPicPr>
+        <p:blipFill>
+          <a:blip r:embed="rId3">
+            <a:extLst>
+              <a:ext uri="{28A0092B-C50C-407E-A947-70E740481C1C}">
+                <a14:useLocalDpi xmlns:a14="http://schemas.microsoft.com/office/drawing/2010/main" val="0"/>
+              </a:ext>
+            </a:extLst>
+          </a:blip>
+          <a:srcRect/>
+          <a:stretch>
+            <a:fillRect/>
+          </a:stretch>
+        </p:blipFill>
+        <p:spPr bwMode="auto">
+          <a:xfrm>
+            <a:off x="228262" y="12674"/>
+            <a:ext cx="8229600" cy="1146175"/>
+          </a:xfrm>
+          <a:prstGeom prst="rect">
+            <a:avLst/>
+          </a:prstGeom>
+          <a:noFill/>
+          <a:ln>
+            <a:noFill/>
+          </a:ln>
+          <a:effectLst/>
+          <a:extLst>
+            <a:ext uri="{909E8E84-426E-40DD-AFC4-6F175D3DCCD1}">
+              <a14:hiddenFill xmlns:a14="http://schemas.microsoft.com/office/drawing/2010/main">
+                <a:blipFill dpi="0" rotWithShape="0">
+                  <a:blip/>
+                  <a:srcRect/>
+                  <a:stretch>
+                    <a:fillRect/>
+                  </a:stretch>
+                </a:blipFill>
+              </a14:hiddenFill>
+            </a:ext>
+            <a:ext uri="{91240B29-F687-4F45-9708-019B960494DF}">
+              <a14:hiddenLine xmlns:a14="http://schemas.microsoft.com/office/drawing/2010/main" w="9525" cap="flat">
+                <a:solidFill>
+                  <a:srgbClr val="3465AF"/>
+                </a:solidFill>
+                <a:round/>
+                <a:headEnd/>
+                <a:tailEnd/>
+              </a14:hiddenLine>
+            </a:ext>
+            <a:ext uri="{AF507438-7753-43E0-B8FC-AC1667EBCBE1}">
+              <a14:hiddenEffects xmlns:a14="http://schemas.microsoft.com/office/drawing/2010/main">
+                <a:effectLst>
+                  <a:outerShdw dist="35921" dir="2700000" algn="ctr" rotWithShape="0">
+                    <a:srgbClr val="808080"/>
+                  </a:outerShdw>
+                </a:effectLst>
+              </a14:hiddenEffects>
+            </a:ext>
+          </a:extLst>
+        </p:spPr>
+      </p:pic>
     </p:spTree>
   </p:cSld>
   <p:clrMapOvr>
@@ -8187,47 +8439,6 @@
       </p:grpSpPr>
       <p:sp>
         <p:nvSpPr>
-          <p:cNvPr id="150" name="CustomShape 1"/>
-          <p:cNvSpPr/>
-          <p:nvPr/>
-        </p:nvSpPr>
-        <p:spPr>
-          <a:xfrm>
-            <a:off x="457200" y="274680"/>
-            <a:ext cx="8228880" cy="1142280"/>
-          </a:xfrm>
-          <a:prstGeom prst="rect">
-            <a:avLst/>
-          </a:prstGeom>
-          <a:noFill/>
-          <a:ln>
-            <a:noFill/>
-          </a:ln>
-        </p:spPr>
-        <p:txBody>
-          <a:bodyPr lIns="90000" tIns="45000" rIns="90000" bIns="45000" anchor="ctr"/>
-          <a:lstStyle/>
-          <a:p>
-            <a:pPr algn="ctr">
-              <a:lnSpc>
-                <a:spcPct val="100000"/>
-              </a:lnSpc>
-            </a:pPr>
-            <a:r>
-              <a:rPr lang="en-US" sz="4400">
-                <a:solidFill>
-                  <a:srgbClr val="000000"/>
-                </a:solidFill>
-                <a:latin typeface="Calibri"/>
-              </a:rPr>
-              <a:t>Conclusion</a:t>
-            </a:r>
-            <a:endParaRPr/>
-          </a:p>
-        </p:txBody>
-      </p:sp>
-      <p:sp>
-        <p:nvSpPr>
           <p:cNvPr id="151" name="CustomShape 2"/>
           <p:cNvSpPr/>
           <p:nvPr/>
@@ -8345,6 +8556,86 @@
           </a:p>
         </p:txBody>
       </p:sp>
+      <p:pic>
+        <p:nvPicPr>
+          <p:cNvPr id="4" name="Picture 1"/>
+          <p:cNvPicPr>
+            <a:picLocks noChangeAspect="1" noChangeArrowheads="1"/>
+          </p:cNvPicPr>
+          <p:nvPr/>
+        </p:nvPicPr>
+        <p:blipFill>
+          <a:blip r:embed="rId3">
+            <a:extLst>
+              <a:ext uri="{BEBA8EAE-BF5A-486C-A8C5-ECC9F3942E4B}">
+                <a14:imgProps xmlns:a14="http://schemas.microsoft.com/office/drawing/2010/main">
+                  <a14:imgLayer r:embed="rId4">
+                    <a14:imgEffect>
+                      <a14:saturation sat="33000"/>
+                    </a14:imgEffect>
+                    <a14:imgEffect>
+                      <a14:brightnessContrast bright="20000" contrast="-20000"/>
+                    </a14:imgEffect>
+                  </a14:imgLayer>
+                </a14:imgProps>
+              </a:ext>
+              <a:ext uri="{28A0092B-C50C-407E-A947-70E740481C1C}">
+                <a14:useLocalDpi xmlns:a14="http://schemas.microsoft.com/office/drawing/2010/main" val="0"/>
+              </a:ext>
+            </a:extLst>
+          </a:blip>
+          <a:srcRect/>
+          <a:stretch>
+            <a:fillRect/>
+          </a:stretch>
+        </p:blipFill>
+        <p:spPr bwMode="auto">
+          <a:xfrm>
+            <a:off x="455760" y="0"/>
+            <a:ext cx="8229600" cy="1146175"/>
+          </a:xfrm>
+          <a:prstGeom prst="rect">
+            <a:avLst/>
+          </a:prstGeom>
+          <a:noFill/>
+          <a:ln>
+            <a:noFill/>
+          </a:ln>
+          <a:effectLst/>
+          <a:extLst>
+            <a:ext uri="{909E8E84-426E-40DD-AFC4-6F175D3DCCD1}">
+              <a14:hiddenFill xmlns:a14="http://schemas.microsoft.com/office/drawing/2010/main">
+                <a:blipFill dpi="0" rotWithShape="0">
+                  <a:blip/>
+                  <a:srcRect/>
+                  <a:stretch>
+                    <a:fillRect/>
+                  </a:stretch>
+                </a:blipFill>
+              </a14:hiddenFill>
+            </a:ext>
+            <a:ext uri="{91240B29-F687-4F45-9708-019B960494DF}">
+              <a14:hiddenLine xmlns:a14="http://schemas.microsoft.com/office/drawing/2010/main" w="9525" cap="flat">
+                <a:solidFill>
+                  <a:srgbClr val="3465AF"/>
+                </a:solidFill>
+                <a:round/>
+                <a:headEnd/>
+                <a:tailEnd/>
+              </a14:hiddenLine>
+            </a:ext>
+            <a:ext uri="{AF507438-7753-43E0-B8FC-AC1667EBCBE1}">
+              <a14:hiddenEffects xmlns:a14="http://schemas.microsoft.com/office/drawing/2010/main">
+                <a:effectLst>
+                  <a:outerShdw dist="35921" dir="2700000" algn="ctr" rotWithShape="0">
+                    <a:srgbClr val="808080"/>
+                  </a:outerShdw>
+                </a:effectLst>
+              </a14:hiddenEffects>
+            </a:ext>
+          </a:extLst>
+        </p:spPr>
+      </p:pic>
     </p:spTree>
   </p:cSld>
   <p:clrMapOvr>
@@ -8402,47 +8693,6 @@
       </p:grpSpPr>
       <p:sp>
         <p:nvSpPr>
-          <p:cNvPr id="116" name="CustomShape 1"/>
-          <p:cNvSpPr/>
-          <p:nvPr/>
-        </p:nvSpPr>
-        <p:spPr>
-          <a:xfrm>
-            <a:off x="457200" y="274680"/>
-            <a:ext cx="8228880" cy="1142280"/>
-          </a:xfrm>
-          <a:prstGeom prst="rect">
-            <a:avLst/>
-          </a:prstGeom>
-          <a:noFill/>
-          <a:ln>
-            <a:noFill/>
-          </a:ln>
-        </p:spPr>
-        <p:txBody>
-          <a:bodyPr lIns="90000" tIns="45000" rIns="90000" bIns="45000" anchor="ctr"/>
-          <a:lstStyle/>
-          <a:p>
-            <a:pPr algn="ctr">
-              <a:lnSpc>
-                <a:spcPct val="100000"/>
-              </a:lnSpc>
-            </a:pPr>
-            <a:r>
-              <a:rPr lang="en-US" sz="4400">
-                <a:solidFill>
-                  <a:srgbClr val="000000"/>
-                </a:solidFill>
-                <a:latin typeface="Calibri"/>
-              </a:rPr>
-              <a:t>What is FBMS?</a:t>
-            </a:r>
-            <a:endParaRPr/>
-          </a:p>
-        </p:txBody>
-      </p:sp>
-      <p:sp>
-        <p:nvSpPr>
           <p:cNvPr id="117" name="CustomShape 2"/>
           <p:cNvSpPr/>
           <p:nvPr/>
@@ -8472,7 +8722,7 @@
               <a:buChar char="•"/>
             </a:pPr>
             <a:r>
-              <a:rPr lang="en-US" sz="3200">
+              <a:rPr lang="en-US" sz="3200" dirty="0">
                 <a:solidFill>
                   <a:srgbClr val="000000"/>
                 </a:solidFill>
@@ -8480,7 +8730,7 @@
               </a:rPr>
               <a:t>A backup solution that automatically revisions your programs</a:t>
             </a:r>
-            <a:endParaRPr/>
+            <a:endParaRPr dirty="0"/>
           </a:p>
           <a:p>
             <a:pPr>
@@ -8491,7 +8741,7 @@
               <a:buChar char="•"/>
             </a:pPr>
             <a:r>
-              <a:rPr lang="en-US" sz="3200">
+              <a:rPr lang="en-US" sz="3200" dirty="0">
                 <a:solidFill>
                   <a:srgbClr val="000000"/>
                 </a:solidFill>
@@ -8499,7 +8749,7 @@
               </a:rPr>
               <a:t>A balance between the powerful version control systems like Subversion and the easy to use online backup systems like Dropbox</a:t>
             </a:r>
-            <a:endParaRPr/>
+            <a:endParaRPr dirty="0"/>
           </a:p>
           <a:p>
             <a:pPr>
@@ -8510,7 +8760,7 @@
               <a:buChar char="•"/>
             </a:pPr>
             <a:r>
-              <a:rPr lang="en-US" sz="3200">
+              <a:rPr lang="en-US" sz="3200" dirty="0">
                 <a:solidFill>
                   <a:srgbClr val="000000"/>
                 </a:solidFill>
@@ -8518,10 +8768,78 @@
               </a:rPr>
               <a:t>Not only can files be restored from the backup, but you can restore them from a given point of time</a:t>
             </a:r>
-            <a:endParaRPr/>
-          </a:p>
-        </p:txBody>
-      </p:sp>
+            <a:endParaRPr dirty="0"/>
+          </a:p>
+        </p:txBody>
+      </p:sp>
+      <p:pic>
+        <p:nvPicPr>
+          <p:cNvPr id="4" name="Picture 2"/>
+          <p:cNvPicPr>
+            <a:picLocks noChangeAspect="1" noChangeArrowheads="1"/>
+          </p:cNvPicPr>
+          <p:nvPr/>
+        </p:nvPicPr>
+        <p:blipFill>
+          <a:blip r:embed="rId3">
+            <a:extLst>
+              <a:ext uri="{28A0092B-C50C-407E-A947-70E740481C1C}">
+                <a14:useLocalDpi xmlns:a14="http://schemas.microsoft.com/office/drawing/2010/main" val="0"/>
+              </a:ext>
+            </a:extLst>
+          </a:blip>
+          <a:srcRect/>
+          <a:stretch>
+            <a:fillRect/>
+          </a:stretch>
+        </p:blipFill>
+        <p:spPr bwMode="auto">
+          <a:xfrm>
+            <a:off x="392186" y="44624"/>
+            <a:ext cx="8235950" cy="1146175"/>
+          </a:xfrm>
+          <a:prstGeom prst="rect">
+            <a:avLst/>
+          </a:prstGeom>
+          <a:noFill/>
+          <a:ln>
+            <a:noFill/>
+          </a:ln>
+          <a:effectLst/>
+          <a:extLst>
+            <a:ext uri="{909E8E84-426E-40DD-AFC4-6F175D3DCCD1}">
+              <a14:hiddenFill xmlns:a14="http://schemas.microsoft.com/office/drawing/2010/main">
+                <a:blipFill dpi="0" rotWithShape="0">
+                  <a:blip/>
+                  <a:srcRect/>
+                  <a:stretch>
+                    <a:fillRect/>
+                  </a:stretch>
+                </a:blipFill>
+              </a14:hiddenFill>
+            </a:ext>
+            <a:ext uri="{91240B29-F687-4F45-9708-019B960494DF}">
+              <a14:hiddenLine xmlns:a14="http://schemas.microsoft.com/office/drawing/2010/main" w="9525" cap="flat">
+                <a:solidFill>
+                  <a:srgbClr val="3465AF"/>
+                </a:solidFill>
+                <a:round/>
+                <a:headEnd/>
+                <a:tailEnd/>
+              </a14:hiddenLine>
+            </a:ext>
+            <a:ext uri="{AF507438-7753-43E0-B8FC-AC1667EBCBE1}">
+              <a14:hiddenEffects xmlns:a14="http://schemas.microsoft.com/office/drawing/2010/main">
+                <a:effectLst>
+                  <a:outerShdw dist="35921" dir="2700000" algn="ctr" rotWithShape="0">
+                    <a:srgbClr val="808080"/>
+                  </a:outerShdw>
+                </a:effectLst>
+              </a14:hiddenEffects>
+            </a:ext>
+          </a:extLst>
+        </p:spPr>
+      </p:pic>
     </p:spTree>
   </p:cSld>
   <p:clrMapOvr>
@@ -8579,47 +8897,6 @@
       </p:grpSpPr>
       <p:sp>
         <p:nvSpPr>
-          <p:cNvPr id="118" name="CustomShape 1"/>
-          <p:cNvSpPr/>
-          <p:nvPr/>
-        </p:nvSpPr>
-        <p:spPr>
-          <a:xfrm>
-            <a:off x="457200" y="274680"/>
-            <a:ext cx="8228880" cy="1142280"/>
-          </a:xfrm>
-          <a:prstGeom prst="rect">
-            <a:avLst/>
-          </a:prstGeom>
-          <a:noFill/>
-          <a:ln>
-            <a:noFill/>
-          </a:ln>
-        </p:spPr>
-        <p:txBody>
-          <a:bodyPr lIns="90000" tIns="45000" rIns="90000" bIns="45000" anchor="ctr"/>
-          <a:lstStyle/>
-          <a:p>
-            <a:pPr algn="ctr">
-              <a:lnSpc>
-                <a:spcPct val="100000"/>
-              </a:lnSpc>
-            </a:pPr>
-            <a:r>
-              <a:rPr lang="en-US" sz="4400">
-                <a:solidFill>
-                  <a:srgbClr val="000000"/>
-                </a:solidFill>
-                <a:latin typeface="Calibri"/>
-              </a:rPr>
-              <a:t>Why use FBMS?</a:t>
-            </a:r>
-            <a:endParaRPr/>
-          </a:p>
-        </p:txBody>
-      </p:sp>
-      <p:sp>
-        <p:nvSpPr>
           <p:cNvPr id="119" name="CustomShape 2"/>
           <p:cNvSpPr/>
           <p:nvPr/>
@@ -8649,15 +8926,24 @@
               <a:buChar char="•"/>
             </a:pPr>
             <a:r>
-              <a:rPr lang="en-US" sz="3200">
+              <a:rPr lang="en-US" sz="3200" dirty="0" smtClean="0">
                 <a:solidFill>
                   <a:srgbClr val="000000"/>
                 </a:solidFill>
                 <a:latin typeface="Calibri"/>
               </a:rPr>
-              <a:t>FBMS is easy to use: set it and forget it</a:t>
-            </a:r>
-            <a:endParaRPr/>
+              <a:t>It’s easy to use FBMS: </a:t>
+            </a:r>
+            <a:r>
+              <a:rPr lang="en-US" sz="3200" dirty="0">
+                <a:solidFill>
+                  <a:srgbClr val="000000"/>
+                </a:solidFill>
+                <a:latin typeface="Calibri"/>
+              </a:rPr>
+              <a:t>set it and forget it</a:t>
+            </a:r>
+            <a:endParaRPr dirty="0"/>
           </a:p>
           <a:p>
             <a:pPr>
@@ -8668,7 +8954,7 @@
               <a:buChar char="•"/>
             </a:pPr>
             <a:r>
-              <a:rPr lang="en-US" sz="3200">
+              <a:rPr lang="en-US" sz="3200" dirty="0">
                 <a:solidFill>
                   <a:srgbClr val="000000"/>
                 </a:solidFill>
@@ -8676,7 +8962,7 @@
               </a:rPr>
               <a:t>When you need to access a file, the interface offers options to restore the file from any given revision</a:t>
             </a:r>
-            <a:endParaRPr/>
+            <a:endParaRPr dirty="0"/>
           </a:p>
           <a:p>
             <a:pPr>
@@ -8687,7 +8973,7 @@
               <a:buChar char="•"/>
             </a:pPr>
             <a:r>
-              <a:rPr lang="en-US" sz="3200">
+              <a:rPr lang="en-US" sz="3200" dirty="0">
                 <a:solidFill>
                   <a:srgbClr val="000000"/>
                 </a:solidFill>
@@ -8695,7 +8981,7 @@
               </a:rPr>
               <a:t>FBMS works on multi-drive systems, including external and network drives</a:t>
             </a:r>
-            <a:endParaRPr/>
+            <a:endParaRPr dirty="0"/>
           </a:p>
           <a:p>
             <a:pPr>
@@ -8706,7 +8992,7 @@
               <a:buChar char="•"/>
             </a:pPr>
             <a:r>
-              <a:rPr lang="en-US" sz="3200">
+              <a:rPr lang="en-US" sz="3200" dirty="0">
                 <a:solidFill>
                   <a:srgbClr val="000000"/>
                 </a:solidFill>
@@ -8714,10 +9000,78 @@
               </a:rPr>
               <a:t>Backups are important: FBMS goes beyond that with the storage of revisions</a:t>
             </a:r>
-            <a:endParaRPr/>
-          </a:p>
-        </p:txBody>
-      </p:sp>
+            <a:endParaRPr dirty="0"/>
+          </a:p>
+        </p:txBody>
+      </p:sp>
+      <p:pic>
+        <p:nvPicPr>
+          <p:cNvPr id="4" name="Picture 2"/>
+          <p:cNvPicPr>
+            <a:picLocks noChangeAspect="1" noChangeArrowheads="1"/>
+          </p:cNvPicPr>
+          <p:nvPr/>
+        </p:nvPicPr>
+        <p:blipFill>
+          <a:blip r:embed="rId3">
+            <a:extLst>
+              <a:ext uri="{28A0092B-C50C-407E-A947-70E740481C1C}">
+                <a14:useLocalDpi xmlns:a14="http://schemas.microsoft.com/office/drawing/2010/main" val="0"/>
+              </a:ext>
+            </a:extLst>
+          </a:blip>
+          <a:srcRect/>
+          <a:stretch>
+            <a:fillRect/>
+          </a:stretch>
+        </p:blipFill>
+        <p:spPr bwMode="auto">
+          <a:xfrm>
+            <a:off x="356634" y="44624"/>
+            <a:ext cx="8235950" cy="1152525"/>
+          </a:xfrm>
+          <a:prstGeom prst="rect">
+            <a:avLst/>
+          </a:prstGeom>
+          <a:noFill/>
+          <a:ln>
+            <a:noFill/>
+          </a:ln>
+          <a:effectLst/>
+          <a:extLst>
+            <a:ext uri="{909E8E84-426E-40DD-AFC4-6F175D3DCCD1}">
+              <a14:hiddenFill xmlns:a14="http://schemas.microsoft.com/office/drawing/2010/main">
+                <a:blipFill dpi="0" rotWithShape="0">
+                  <a:blip/>
+                  <a:srcRect/>
+                  <a:stretch>
+                    <a:fillRect/>
+                  </a:stretch>
+                </a:blipFill>
+              </a14:hiddenFill>
+            </a:ext>
+            <a:ext uri="{91240B29-F687-4F45-9708-019B960494DF}">
+              <a14:hiddenLine xmlns:a14="http://schemas.microsoft.com/office/drawing/2010/main" w="9525" cap="flat">
+                <a:solidFill>
+                  <a:srgbClr val="3465AF"/>
+                </a:solidFill>
+                <a:round/>
+                <a:headEnd/>
+                <a:tailEnd/>
+              </a14:hiddenLine>
+            </a:ext>
+            <a:ext uri="{AF507438-7753-43E0-B8FC-AC1667EBCBE1}">
+              <a14:hiddenEffects xmlns:a14="http://schemas.microsoft.com/office/drawing/2010/main">
+                <a:effectLst>
+                  <a:outerShdw dist="35921" dir="2700000" algn="ctr" rotWithShape="0">
+                    <a:srgbClr val="808080"/>
+                  </a:outerShdw>
+                </a:effectLst>
+              </a14:hiddenEffects>
+            </a:ext>
+          </a:extLst>
+        </p:spPr>
+      </p:pic>
     </p:spTree>
   </p:cSld>
   <p:clrMapOvr>
@@ -8780,14 +9134,25 @@
           <p:nvPr/>
         </p:nvPicPr>
         <p:blipFill>
-          <a:blip r:embed="rId3"/>
+          <a:blip r:embed="rId3">
+            <a:clrChange>
+              <a:clrFrom>
+                <a:srgbClr val="FFFFFF"/>
+              </a:clrFrom>
+              <a:clrTo>
+                <a:srgbClr val="FFFFFF">
+                  <a:alpha val="0"/>
+                </a:srgbClr>
+              </a:clrTo>
+            </a:clrChange>
+          </a:blip>
           <a:stretch>
             <a:fillRect/>
           </a:stretch>
         </p:blipFill>
         <p:spPr>
           <a:xfrm>
-            <a:off x="0" y="692640"/>
+            <a:off x="4467" y="764704"/>
             <a:ext cx="9180360" cy="5649120"/>
           </a:xfrm>
           <a:prstGeom prst="rect">
@@ -8833,7 +9198,18 @@
           <p:nvPr/>
         </p:nvPicPr>
         <p:blipFill>
-          <a:blip r:embed="rId3"/>
+          <a:blip r:embed="rId3">
+            <a:clrChange>
+              <a:clrFrom>
+                <a:srgbClr val="FFFFFF"/>
+              </a:clrFrom>
+              <a:clrTo>
+                <a:srgbClr val="FFFFFF">
+                  <a:alpha val="0"/>
+                </a:srgbClr>
+              </a:clrTo>
+            </a:clrChange>
+          </a:blip>
           <a:stretch>
             <a:fillRect/>
           </a:stretch>
@@ -8851,16 +9227,31 @@
           </a:ln>
         </p:spPr>
       </p:pic>
-      <p:sp>
-        <p:nvSpPr>
-          <p:cNvPr id="122" name="CustomShape 1"/>
-          <p:cNvSpPr/>
+      <p:pic>
+        <p:nvPicPr>
+          <p:cNvPr id="4" name="Picture 2"/>
+          <p:cNvPicPr>
+            <a:picLocks noChangeAspect="1" noChangeArrowheads="1"/>
+          </p:cNvPicPr>
           <p:nvPr/>
-        </p:nvSpPr>
-        <p:spPr>
-          <a:xfrm>
-            <a:off x="457200" y="274680"/>
-            <a:ext cx="8228880" cy="1142280"/>
+        </p:nvPicPr>
+        <p:blipFill>
+          <a:blip r:embed="rId4">
+            <a:extLst>
+              <a:ext uri="{28A0092B-C50C-407E-A947-70E740481C1C}">
+                <a14:useLocalDpi xmlns:a14="http://schemas.microsoft.com/office/drawing/2010/main" val="0"/>
+              </a:ext>
+            </a:extLst>
+          </a:blip>
+          <a:srcRect/>
+          <a:stretch>
+            <a:fillRect/>
+          </a:stretch>
+        </p:blipFill>
+        <p:spPr bwMode="auto">
+          <a:xfrm>
+            <a:off x="251520" y="115887"/>
+            <a:ext cx="8234363" cy="1146175"/>
           </a:xfrm>
           <a:prstGeom prst="rect">
             <a:avLst/>
@@ -8869,29 +9260,41 @@
           <a:ln>
             <a:noFill/>
           </a:ln>
-        </p:spPr>
-        <p:txBody>
-          <a:bodyPr lIns="90000" tIns="45000" rIns="90000" bIns="45000" anchor="ctr"/>
-          <a:lstStyle/>
-          <a:p>
-            <a:pPr algn="ctr">
-              <a:lnSpc>
-                <a:spcPct val="100000"/>
-              </a:lnSpc>
-            </a:pPr>
-            <a:r>
-              <a:rPr lang="en-US" sz="3600">
+          <a:effectLst/>
+          <a:extLst>
+            <a:ext uri="{909E8E84-426E-40DD-AFC4-6F175D3DCCD1}">
+              <a14:hiddenFill xmlns:a14="http://schemas.microsoft.com/office/drawing/2010/main">
+                <a:blipFill dpi="0" rotWithShape="0">
+                  <a:blip/>
+                  <a:srcRect/>
+                  <a:stretch>
+                    <a:fillRect/>
+                  </a:stretch>
+                </a:blipFill>
+              </a14:hiddenFill>
+            </a:ext>
+            <a:ext uri="{91240B29-F687-4F45-9708-019B960494DF}">
+              <a14:hiddenLine xmlns:a14="http://schemas.microsoft.com/office/drawing/2010/main" w="9525" cap="flat">
                 <a:solidFill>
-                  <a:srgbClr val="000000"/>
+                  <a:srgbClr val="3465AF"/>
                 </a:solidFill>
-                <a:latin typeface="Calibri"/>
-              </a:rPr>
-              <a:t>Startup system sequence diagram</a:t>
-            </a:r>
-            <a:endParaRPr/>
-          </a:p>
-        </p:txBody>
-      </p:sp>
+                <a:round/>
+                <a:headEnd/>
+                <a:tailEnd/>
+              </a14:hiddenLine>
+            </a:ext>
+            <a:ext uri="{AF507438-7753-43E0-B8FC-AC1667EBCBE1}">
+              <a14:hiddenEffects xmlns:a14="http://schemas.microsoft.com/office/drawing/2010/main">
+                <a:effectLst>
+                  <a:outerShdw dist="35921" dir="2700000" algn="ctr" rotWithShape="0">
+                    <a:srgbClr val="808080"/>
+                  </a:outerShdw>
+                </a:effectLst>
+              </a14:hiddenEffects>
+            </a:ext>
+          </a:extLst>
+        </p:spPr>
+      </p:pic>
     </p:spTree>
   </p:cSld>
   <p:clrMapOvr>
@@ -8928,8 +9331,8 @@
         </p:nvSpPr>
         <p:spPr>
           <a:xfrm>
-            <a:off x="457200" y="2709000"/>
-            <a:ext cx="8228880" cy="3416400"/>
+            <a:off x="457200" y="2852936"/>
+            <a:ext cx="8228880" cy="3272464"/>
           </a:xfrm>
           <a:prstGeom prst="rect">
             <a:avLst/>
@@ -8949,7 +9352,7 @@
               </a:lnSpc>
             </a:pPr>
             <a:r>
-              <a:rPr lang="en-US" sz="3200" u="sng">
+              <a:rPr lang="en-US" sz="3200" u="sng" dirty="0" err="1">
                 <a:solidFill>
                   <a:srgbClr val="0000FF"/>
                 </a:solidFill>
@@ -8958,7 +9361,7 @@
               </a:rPr>
               <a:t>Class_diagram</a:t>
             </a:r>
-            <a:endParaRPr/>
+            <a:endParaRPr dirty="0"/>
           </a:p>
         </p:txBody>
       </p:sp>
@@ -8992,47 +9395,6 @@
       </p:grpSpPr>
       <p:sp>
         <p:nvSpPr>
-          <p:cNvPr id="124" name="CustomShape 1"/>
-          <p:cNvSpPr/>
-          <p:nvPr/>
-        </p:nvSpPr>
-        <p:spPr>
-          <a:xfrm>
-            <a:off x="457200" y="274680"/>
-            <a:ext cx="8228880" cy="1142280"/>
-          </a:xfrm>
-          <a:prstGeom prst="rect">
-            <a:avLst/>
-          </a:prstGeom>
-          <a:noFill/>
-          <a:ln>
-            <a:noFill/>
-          </a:ln>
-        </p:spPr>
-        <p:txBody>
-          <a:bodyPr lIns="90000" tIns="45000" rIns="90000" bIns="45000" anchor="ctr"/>
-          <a:lstStyle/>
-          <a:p>
-            <a:pPr algn="ctr">
-              <a:lnSpc>
-                <a:spcPct val="100000"/>
-              </a:lnSpc>
-            </a:pPr>
-            <a:r>
-              <a:rPr lang="en-US" sz="4400">
-                <a:solidFill>
-                  <a:srgbClr val="000000"/>
-                </a:solidFill>
-                <a:latin typeface="Calibri"/>
-              </a:rPr>
-              <a:t>Achieved so far</a:t>
-            </a:r>
-            <a:endParaRPr/>
-          </a:p>
-        </p:txBody>
-      </p:sp>
-      <p:sp>
-        <p:nvSpPr>
           <p:cNvPr id="125" name="CustomShape 2"/>
           <p:cNvSpPr/>
           <p:nvPr/>
@@ -9062,7 +9424,50 @@
               <a:buChar char="•"/>
             </a:pPr>
             <a:r>
-              <a:rPr lang="en-US" sz="3200">
+              <a:rPr lang="en-US" sz="3200" dirty="0" smtClean="0">
+                <a:solidFill>
+                  <a:srgbClr val="000000"/>
+                </a:solidFill>
+                <a:latin typeface="Calibri"/>
+              </a:rPr>
+              <a:t>The </a:t>
+            </a:r>
+            <a:r>
+              <a:rPr lang="en-US" sz="3200" dirty="0">
+                <a:solidFill>
+                  <a:srgbClr val="000000"/>
+                </a:solidFill>
+                <a:latin typeface="Calibri"/>
+              </a:rPr>
+              <a:t>first version </a:t>
+            </a:r>
+            <a:r>
+              <a:rPr lang="en-US" sz="3200" dirty="0" err="1">
+                <a:solidFill>
+                  <a:srgbClr val="000000"/>
+                </a:solidFill>
+                <a:latin typeface="Calibri"/>
+              </a:rPr>
+              <a:t>revisioned</a:t>
+            </a:r>
+            <a:r>
+              <a:rPr lang="en-US" sz="3200" dirty="0">
+                <a:solidFill>
+                  <a:srgbClr val="000000"/>
+                </a:solidFill>
+                <a:latin typeface="Calibri"/>
+              </a:rPr>
+              <a:t> plain text files, making patches of the changes in each revision</a:t>
+            </a:r>
+            <a:endParaRPr dirty="0"/>
+          </a:p>
+          <a:p>
+            <a:pPr>
+              <a:buFont typeface="Arial"/>
+              <a:buChar char="•"/>
+            </a:pPr>
+            <a:r>
+              <a:rPr lang="en-CA" sz="3200" dirty="0">
                 <a:solidFill>
                   <a:srgbClr val="000000"/>
                 </a:solidFill>
@@ -9070,7 +9475,7 @@
               </a:rPr>
               <a:t>The second version of the project is now finished</a:t>
             </a:r>
-            <a:endParaRPr/>
+            <a:endParaRPr lang="en-CA" sz="3200" dirty="0"/>
           </a:p>
           <a:p>
             <a:pPr>
@@ -9081,37 +9486,95 @@
               <a:buChar char="•"/>
             </a:pPr>
             <a:r>
-              <a:rPr lang="en-US" sz="3200">
+              <a:rPr lang="en-US" sz="3200" dirty="0" smtClean="0">
                 <a:solidFill>
                   <a:srgbClr val="000000"/>
                 </a:solidFill>
                 <a:latin typeface="Calibri"/>
               </a:rPr>
-              <a:t>The first version revisioned plain text files, making patches of the changes in each revision</a:t>
-            </a:r>
-            <a:endParaRPr/>
-          </a:p>
-          <a:p>
-            <a:pPr>
-              <a:lnSpc>
-                <a:spcPct val="100000"/>
-              </a:lnSpc>
-              <a:buFont typeface="Arial"/>
-              <a:buChar char="•"/>
-            </a:pPr>
-            <a:r>
-              <a:rPr lang="en-US" sz="3200">
+              <a:t>Version </a:t>
+            </a:r>
+            <a:r>
+              <a:rPr lang="en-US" sz="3200" dirty="0">
                 <a:solidFill>
                   <a:srgbClr val="000000"/>
                 </a:solidFill>
                 <a:latin typeface="Calibri"/>
               </a:rPr>
-              <a:t>Version 2.0 of the program added support for binary files, which are stored as raw binary data</a:t>
-            </a:r>
-            <a:endParaRPr/>
-          </a:p>
-        </p:txBody>
-      </p:sp>
+              <a:t>2.0 of the program added support for binary files, which are stored as raw binary data</a:t>
+            </a:r>
+            <a:endParaRPr dirty="0"/>
+          </a:p>
+        </p:txBody>
+      </p:sp>
+      <p:pic>
+        <p:nvPicPr>
+          <p:cNvPr id="4" name="Picture 1"/>
+          <p:cNvPicPr>
+            <a:picLocks noChangeAspect="1" noChangeArrowheads="1"/>
+          </p:cNvPicPr>
+          <p:nvPr/>
+        </p:nvPicPr>
+        <p:blipFill>
+          <a:blip r:embed="rId2">
+            <a:extLst>
+              <a:ext uri="{28A0092B-C50C-407E-A947-70E740481C1C}">
+                <a14:useLocalDpi xmlns:a14="http://schemas.microsoft.com/office/drawing/2010/main" val="0"/>
+              </a:ext>
+            </a:extLst>
+          </a:blip>
+          <a:srcRect/>
+          <a:stretch>
+            <a:fillRect/>
+          </a:stretch>
+        </p:blipFill>
+        <p:spPr bwMode="auto">
+          <a:xfrm>
+            <a:off x="323528" y="44624"/>
+            <a:ext cx="8229600" cy="1146175"/>
+          </a:xfrm>
+          <a:prstGeom prst="rect">
+            <a:avLst/>
+          </a:prstGeom>
+          <a:noFill/>
+          <a:ln>
+            <a:noFill/>
+          </a:ln>
+          <a:effectLst/>
+          <a:extLst>
+            <a:ext uri="{909E8E84-426E-40DD-AFC4-6F175D3DCCD1}">
+              <a14:hiddenFill xmlns:a14="http://schemas.microsoft.com/office/drawing/2010/main">
+                <a:blipFill dpi="0" rotWithShape="0">
+                  <a:blip/>
+                  <a:srcRect/>
+                  <a:stretch>
+                    <a:fillRect/>
+                  </a:stretch>
+                </a:blipFill>
+              </a14:hiddenFill>
+            </a:ext>
+            <a:ext uri="{91240B29-F687-4F45-9708-019B960494DF}">
+              <a14:hiddenLine xmlns:a14="http://schemas.microsoft.com/office/drawing/2010/main" w="9525" cap="flat">
+                <a:solidFill>
+                  <a:srgbClr val="3465AF"/>
+                </a:solidFill>
+                <a:round/>
+                <a:headEnd/>
+                <a:tailEnd/>
+              </a14:hiddenLine>
+            </a:ext>
+            <a:ext uri="{AF507438-7753-43E0-B8FC-AC1667EBCBE1}">
+              <a14:hiddenEffects xmlns:a14="http://schemas.microsoft.com/office/drawing/2010/main">
+                <a:effectLst>
+                  <a:outerShdw dist="35921" dir="2700000" algn="ctr" rotWithShape="0">
+                    <a:srgbClr val="808080"/>
+                  </a:outerShdw>
+                </a:effectLst>
+              </a14:hiddenEffects>
+            </a:ext>
+          </a:extLst>
+        </p:spPr>
+      </p:pic>
     </p:spTree>
   </p:cSld>
   <p:clrMapOvr>
@@ -9142,47 +9605,6 @@
       </p:grpSpPr>
       <p:sp>
         <p:nvSpPr>
-          <p:cNvPr id="126" name="CustomShape 1"/>
-          <p:cNvSpPr/>
-          <p:nvPr/>
-        </p:nvSpPr>
-        <p:spPr>
-          <a:xfrm>
-            <a:off x="457200" y="274680"/>
-            <a:ext cx="8228880" cy="1142280"/>
-          </a:xfrm>
-          <a:prstGeom prst="rect">
-            <a:avLst/>
-          </a:prstGeom>
-          <a:noFill/>
-          <a:ln>
-            <a:noFill/>
-          </a:ln>
-        </p:spPr>
-        <p:txBody>
-          <a:bodyPr lIns="90000" tIns="45000" rIns="90000" bIns="45000" anchor="ctr"/>
-          <a:lstStyle/>
-          <a:p>
-            <a:pPr algn="ctr">
-              <a:lnSpc>
-                <a:spcPct val="100000"/>
-              </a:lnSpc>
-            </a:pPr>
-            <a:r>
-              <a:rPr lang="en-US" sz="4400">
-                <a:solidFill>
-                  <a:srgbClr val="000000"/>
-                </a:solidFill>
-                <a:latin typeface="Calibri"/>
-              </a:rPr>
-              <a:t>Achieved so far</a:t>
-            </a:r>
-            <a:endParaRPr/>
-          </a:p>
-        </p:txBody>
-      </p:sp>
-      <p:sp>
-        <p:nvSpPr>
           <p:cNvPr id="127" name="CustomShape 2"/>
           <p:cNvSpPr/>
           <p:nvPr/>
@@ -9262,6 +9684,74 @@
           </a:p>
         </p:txBody>
       </p:sp>
+      <p:pic>
+        <p:nvPicPr>
+          <p:cNvPr id="5" name="Picture 1"/>
+          <p:cNvPicPr>
+            <a:picLocks noChangeAspect="1" noChangeArrowheads="1"/>
+          </p:cNvPicPr>
+          <p:nvPr/>
+        </p:nvPicPr>
+        <p:blipFill>
+          <a:blip r:embed="rId3">
+            <a:extLst>
+              <a:ext uri="{28A0092B-C50C-407E-A947-70E740481C1C}">
+                <a14:useLocalDpi xmlns:a14="http://schemas.microsoft.com/office/drawing/2010/main" val="0"/>
+              </a:ext>
+            </a:extLst>
+          </a:blip>
+          <a:srcRect/>
+          <a:stretch>
+            <a:fillRect/>
+          </a:stretch>
+        </p:blipFill>
+        <p:spPr bwMode="auto">
+          <a:xfrm>
+            <a:off x="323528" y="44624"/>
+            <a:ext cx="8229600" cy="1146175"/>
+          </a:xfrm>
+          <a:prstGeom prst="rect">
+            <a:avLst/>
+          </a:prstGeom>
+          <a:noFill/>
+          <a:ln>
+            <a:noFill/>
+          </a:ln>
+          <a:effectLst/>
+          <a:extLst>
+            <a:ext uri="{909E8E84-426E-40DD-AFC4-6F175D3DCCD1}">
+              <a14:hiddenFill xmlns:a14="http://schemas.microsoft.com/office/drawing/2010/main">
+                <a:blipFill dpi="0" rotWithShape="0">
+                  <a:blip/>
+                  <a:srcRect/>
+                  <a:stretch>
+                    <a:fillRect/>
+                  </a:stretch>
+                </a:blipFill>
+              </a14:hiddenFill>
+            </a:ext>
+            <a:ext uri="{91240B29-F687-4F45-9708-019B960494DF}">
+              <a14:hiddenLine xmlns:a14="http://schemas.microsoft.com/office/drawing/2010/main" w="9525" cap="flat">
+                <a:solidFill>
+                  <a:srgbClr val="3465AF"/>
+                </a:solidFill>
+                <a:round/>
+                <a:headEnd/>
+                <a:tailEnd/>
+              </a14:hiddenLine>
+            </a:ext>
+            <a:ext uri="{AF507438-7753-43E0-B8FC-AC1667EBCBE1}">
+              <a14:hiddenEffects xmlns:a14="http://schemas.microsoft.com/office/drawing/2010/main">
+                <a:effectLst>
+                  <a:outerShdw dist="35921" dir="2700000" algn="ctr" rotWithShape="0">
+                    <a:srgbClr val="808080"/>
+                  </a:outerShdw>
+                </a:effectLst>
+              </a14:hiddenEffects>
+            </a:ext>
+          </a:extLst>
+        </p:spPr>
+      </p:pic>
     </p:spTree>
   </p:cSld>
   <p:clrMapOvr>
@@ -9319,47 +9809,6 @@
       </p:grpSpPr>
       <p:sp>
         <p:nvSpPr>
-          <p:cNvPr id="128" name="CustomShape 1"/>
-          <p:cNvSpPr/>
-          <p:nvPr/>
-        </p:nvSpPr>
-        <p:spPr>
-          <a:xfrm>
-            <a:off x="457200" y="274680"/>
-            <a:ext cx="8228880" cy="1142280"/>
-          </a:xfrm>
-          <a:prstGeom prst="rect">
-            <a:avLst/>
-          </a:prstGeom>
-          <a:noFill/>
-          <a:ln>
-            <a:noFill/>
-          </a:ln>
-        </p:spPr>
-        <p:txBody>
-          <a:bodyPr lIns="90000" tIns="45000" rIns="90000" bIns="45000" anchor="ctr"/>
-          <a:lstStyle/>
-          <a:p>
-            <a:pPr algn="ctr">
-              <a:lnSpc>
-                <a:spcPct val="100000"/>
-              </a:lnSpc>
-            </a:pPr>
-            <a:r>
-              <a:rPr lang="en-US" sz="4400" dirty="0">
-                <a:solidFill>
-                  <a:srgbClr val="000000"/>
-                </a:solidFill>
-                <a:latin typeface="Calibri"/>
-              </a:rPr>
-              <a:t>Achieved so far</a:t>
-            </a:r>
-            <a:endParaRPr dirty="0"/>
-          </a:p>
-        </p:txBody>
-      </p:sp>
-      <p:sp>
-        <p:nvSpPr>
           <p:cNvPr id="129" name="CustomShape 2"/>
           <p:cNvSpPr/>
           <p:nvPr/>
@@ -9422,6 +9871,74 @@
           <a:ln>
             <a:noFill/>
           </a:ln>
+        </p:spPr>
+      </p:pic>
+      <p:pic>
+        <p:nvPicPr>
+          <p:cNvPr id="6" name="Picture 1"/>
+          <p:cNvPicPr>
+            <a:picLocks noChangeAspect="1" noChangeArrowheads="1"/>
+          </p:cNvPicPr>
+          <p:nvPr/>
+        </p:nvPicPr>
+        <p:blipFill>
+          <a:blip r:embed="rId4">
+            <a:extLst>
+              <a:ext uri="{28A0092B-C50C-407E-A947-70E740481C1C}">
+                <a14:useLocalDpi xmlns:a14="http://schemas.microsoft.com/office/drawing/2010/main" val="0"/>
+              </a:ext>
+            </a:extLst>
+          </a:blip>
+          <a:srcRect/>
+          <a:stretch>
+            <a:fillRect/>
+          </a:stretch>
+        </p:blipFill>
+        <p:spPr bwMode="auto">
+          <a:xfrm>
+            <a:off x="323528" y="44624"/>
+            <a:ext cx="8229600" cy="1146175"/>
+          </a:xfrm>
+          <a:prstGeom prst="rect">
+            <a:avLst/>
+          </a:prstGeom>
+          <a:noFill/>
+          <a:ln>
+            <a:noFill/>
+          </a:ln>
+          <a:effectLst/>
+          <a:extLst>
+            <a:ext uri="{909E8E84-426E-40DD-AFC4-6F175D3DCCD1}">
+              <a14:hiddenFill xmlns:a14="http://schemas.microsoft.com/office/drawing/2010/main">
+                <a:blipFill dpi="0" rotWithShape="0">
+                  <a:blip/>
+                  <a:srcRect/>
+                  <a:stretch>
+                    <a:fillRect/>
+                  </a:stretch>
+                </a:blipFill>
+              </a14:hiddenFill>
+            </a:ext>
+            <a:ext uri="{91240B29-F687-4F45-9708-019B960494DF}">
+              <a14:hiddenLine xmlns:a14="http://schemas.microsoft.com/office/drawing/2010/main" w="9525" cap="flat">
+                <a:solidFill>
+                  <a:srgbClr val="3465AF"/>
+                </a:solidFill>
+                <a:round/>
+                <a:headEnd/>
+                <a:tailEnd/>
+              </a14:hiddenLine>
+            </a:ext>
+            <a:ext uri="{AF507438-7753-43E0-B8FC-AC1667EBCBE1}">
+              <a14:hiddenEffects xmlns:a14="http://schemas.microsoft.com/office/drawing/2010/main">
+                <a:effectLst>
+                  <a:outerShdw dist="35921" dir="2700000" algn="ctr" rotWithShape="0">
+                    <a:srgbClr val="808080"/>
+                  </a:outerShdw>
+                </a:effectLst>
+              </a14:hiddenEffects>
+            </a:ext>
+          </a:extLst>
         </p:spPr>
       </p:pic>
     </p:spTree>

</xml_diff>